<commit_message>
added workpalcement report and updated presentations
</commit_message>
<xml_diff>
--- a/IoT.pptx
+++ b/IoT.pptx
@@ -218,7 +218,7 @@
             <a:fld id="{87EDFAC8-5991-3145-9793-9A313C8FA165}" type="datetimeFigureOut">
               <a:rPr lang="en-US" smtClean="0"/>
               <a:pPr/>
-              <a:t>8/7/2014</a:t>
+              <a:t>8/8/2014</a:t>
             </a:fld>
             <a:endParaRPr lang="en-US"/>
           </a:p>
@@ -387,7 +387,7 @@
     </p:spTree>
     <p:extLst>
       <p:ext uri="{BB962C8B-B14F-4D97-AF65-F5344CB8AC3E}">
-        <p14:creationId xmlns:p14="http://schemas.microsoft.com/office/powerpoint/2010/main" xmlns="" val="4124804405"/>
+        <p14:creationId xmlns:p14="http://schemas.microsoft.com/office/powerpoint/2010/main" val="4124804405"/>
       </p:ext>
     </p:extLst>
   </p:cSld>
@@ -532,10 +532,38 @@
           <a:lstStyle/>
           <a:p>
             <a:r>
-              <a:rPr lang="en-GB" sz="1200" dirty="0" smtClean="0">
-                <a:latin typeface="Trade Gothic Next LT Pro Lt" charset="0"/>
-              </a:rPr>
-              <a:t>While the costs of sensors and actuators go down, more and more devices will integrate them into their systems</a:t>
+              <a:rPr lang="en-GB" dirty="0" smtClean="0"/>
+              <a:t>Today</a:t>
+            </a:r>
+            <a:r>
+              <a:rPr lang="en-GB" baseline="0" dirty="0" smtClean="0"/>
+              <a:t> I will be furthering your knowledge in the concept of The Internet of Things or IoT. </a:t>
+            </a:r>
+          </a:p>
+          <a:p>
+            <a:endParaRPr lang="en-GB" baseline="0" dirty="0" smtClean="0"/>
+          </a:p>
+          <a:p>
+            <a:r>
+              <a:rPr lang="en-GB" baseline="0" dirty="0" smtClean="0"/>
+              <a:t>I will be providing examples and explaining to you how this emerging market will not only impact your personal life but also your professional life. </a:t>
+            </a:r>
+          </a:p>
+          <a:p>
+            <a:endParaRPr lang="en-GB" baseline="0" dirty="0" smtClean="0"/>
+          </a:p>
+          <a:p>
+            <a:r>
+              <a:rPr lang="en-GB" baseline="0" dirty="0" smtClean="0"/>
+              <a:t>I will also be talking about BlackBerry’s recent </a:t>
+            </a:r>
+            <a:r>
+              <a:rPr lang="en-GB" baseline="0" dirty="0" err="1" smtClean="0"/>
+              <a:t>announcment</a:t>
+            </a:r>
+            <a:r>
+              <a:rPr lang="en-GB" baseline="0" dirty="0" smtClean="0"/>
+              <a:t> of Project Ion and what exactly the guys in waterloo are attempting here. </a:t>
             </a:r>
             <a:endParaRPr lang="en-US" dirty="0"/>
           </a:p>
@@ -559,7 +587,7 @@
             <a:fld id="{E4773DDA-7232-1E41-9A12-ECB93A71EA0E}" type="slidenum">
               <a:rPr lang="en-US" smtClean="0"/>
               <a:pPr/>
-              <a:t>6</a:t>
+              <a:t>2</a:t>
             </a:fld>
             <a:endParaRPr lang="en-US"/>
           </a:p>
@@ -568,7 +596,109 @@
     </p:spTree>
     <p:extLst>
       <p:ext uri="{BB962C8B-B14F-4D97-AF65-F5344CB8AC3E}">
-        <p14:creationId xmlns:p14="http://schemas.microsoft.com/office/powerpoint/2010/main" xmlns="" val="2162989649"/>
+        <p14:creationId xmlns:p14="http://schemas.microsoft.com/office/powerpoint/2010/main" val="3705908485"/>
+      </p:ext>
+    </p:extLst>
+  </p:cSld>
+  <p:clrMapOvr>
+    <a:masterClrMapping/>
+  </p:clrMapOvr>
+</p:notes>
+</file>
+
+<file path=ppt/notesSlides/notesSlide10.xml><?xml version="1.0" encoding="utf-8"?>
+<p:notes xmlns:a="http://schemas.openxmlformats.org/drawingml/2006/main" xmlns:r="http://schemas.openxmlformats.org/officeDocument/2006/relationships" xmlns:p="http://schemas.openxmlformats.org/presentationml/2006/main">
+  <p:cSld>
+    <p:spTree>
+      <p:nvGrpSpPr>
+        <p:cNvPr id="1" name=""/>
+        <p:cNvGrpSpPr/>
+        <p:nvPr/>
+      </p:nvGrpSpPr>
+      <p:grpSpPr>
+        <a:xfrm>
+          <a:off x="0" y="0"/>
+          <a:ext cx="0" cy="0"/>
+          <a:chOff x="0" y="0"/>
+          <a:chExt cx="0" cy="0"/>
+        </a:xfrm>
+      </p:grpSpPr>
+      <p:sp>
+        <p:nvSpPr>
+          <p:cNvPr id="2" name="Slide Image Placeholder 1"/>
+          <p:cNvSpPr>
+            <a:spLocks noGrp="1" noRot="1" noChangeAspect="1"/>
+          </p:cNvSpPr>
+          <p:nvPr>
+            <p:ph type="sldImg"/>
+          </p:nvPr>
+        </p:nvSpPr>
+        <p:spPr/>
+      </p:sp>
+      <p:sp>
+        <p:nvSpPr>
+          <p:cNvPr id="3" name="Notes Placeholder 2"/>
+          <p:cNvSpPr>
+            <a:spLocks noGrp="1"/>
+          </p:cNvSpPr>
+          <p:nvPr>
+            <p:ph type="body" idx="1"/>
+          </p:nvPr>
+        </p:nvSpPr>
+        <p:spPr/>
+        <p:txBody>
+          <a:bodyPr/>
+          <a:lstStyle/>
+          <a:p>
+            <a:r>
+              <a:rPr lang="en-GB" dirty="0" smtClean="0"/>
+              <a:t>I</a:t>
+            </a:r>
+            <a:r>
+              <a:rPr lang="en-GB" baseline="0" dirty="0" smtClean="0"/>
+              <a:t> will be sending a email with this PowerPoint so if you would like to do any further reading then please refer to these links. </a:t>
+            </a:r>
+          </a:p>
+          <a:p>
+            <a:endParaRPr lang="en-GB" baseline="0" dirty="0" smtClean="0"/>
+          </a:p>
+          <a:p>
+            <a:r>
+              <a:rPr lang="en-GB" baseline="0" dirty="0" smtClean="0"/>
+              <a:t>Any Questions? </a:t>
+            </a:r>
+            <a:endParaRPr lang="en-US" dirty="0"/>
+          </a:p>
+        </p:txBody>
+      </p:sp>
+      <p:sp>
+        <p:nvSpPr>
+          <p:cNvPr id="4" name="Slide Number Placeholder 3"/>
+          <p:cNvSpPr>
+            <a:spLocks noGrp="1"/>
+          </p:cNvSpPr>
+          <p:nvPr>
+            <p:ph type="sldNum" sz="quarter" idx="10"/>
+          </p:nvPr>
+        </p:nvSpPr>
+        <p:spPr/>
+        <p:txBody>
+          <a:bodyPr/>
+          <a:lstStyle/>
+          <a:p>
+            <a:fld id="{E4773DDA-7232-1E41-9A12-ECB93A71EA0E}" type="slidenum">
+              <a:rPr lang="en-US" smtClean="0"/>
+              <a:pPr/>
+              <a:t>11</a:t>
+            </a:fld>
+            <a:endParaRPr lang="en-US"/>
+          </a:p>
+        </p:txBody>
+      </p:sp>
+    </p:spTree>
+    <p:extLst>
+      <p:ext uri="{BB962C8B-B14F-4D97-AF65-F5344CB8AC3E}">
+        <p14:creationId xmlns:p14="http://schemas.microsoft.com/office/powerpoint/2010/main" val="2064041289"/>
       </p:ext>
     </p:extLst>
   </p:cSld>
@@ -623,10 +753,657 @@
           <a:lstStyle/>
           <a:p>
             <a:r>
+              <a:rPr lang="en-GB" dirty="0" smtClean="0"/>
+              <a:t>[Read</a:t>
+            </a:r>
+            <a:r>
+              <a:rPr lang="en-GB" baseline="0" dirty="0" smtClean="0"/>
+              <a:t> Definition</a:t>
+            </a:r>
+            <a:r>
+              <a:rPr lang="en-GB" dirty="0" smtClean="0"/>
+              <a:t>]</a:t>
+            </a:r>
+          </a:p>
+          <a:p>
+            <a:r>
+              <a:rPr lang="en-GB" dirty="0" smtClean="0"/>
+              <a:t>These include</a:t>
+            </a:r>
+            <a:r>
+              <a:rPr lang="en-GB" baseline="0" dirty="0" smtClean="0"/>
+              <a:t> objects that exist today like smartphones, smart TV’s, smart thermostats and so on. </a:t>
+            </a:r>
+          </a:p>
+          <a:p>
+            <a:endParaRPr lang="en-GB" baseline="0" dirty="0" smtClean="0"/>
+          </a:p>
+          <a:p>
+            <a:r>
+              <a:rPr lang="en-GB" baseline="0" dirty="0" smtClean="0"/>
+              <a:t>Its essentially an object that is connected to a network to enhance that objects capabilities from its original intention.</a:t>
+            </a:r>
+          </a:p>
+          <a:p>
+            <a:endParaRPr lang="en-GB" baseline="0" dirty="0" smtClean="0"/>
+          </a:p>
+          <a:p>
+            <a:r>
+              <a:rPr lang="en-GB" baseline="0" dirty="0" smtClean="0"/>
+              <a:t>These devices could be: </a:t>
+            </a:r>
+          </a:p>
+          <a:p>
+            <a:r>
+              <a:rPr lang="en-GB" baseline="0" dirty="0" smtClean="0"/>
+              <a:t>Smartphones</a:t>
+            </a:r>
+          </a:p>
+          <a:p>
+            <a:r>
+              <a:rPr lang="en-GB" baseline="0" dirty="0" smtClean="0"/>
+              <a:t>Smart Watches</a:t>
+            </a:r>
+          </a:p>
+          <a:p>
+            <a:r>
+              <a:rPr lang="en-GB" baseline="0" dirty="0" smtClean="0"/>
+              <a:t>Smart TV’s </a:t>
+            </a:r>
+          </a:p>
+          <a:p>
+            <a:r>
+              <a:rPr lang="en-GB" baseline="0" dirty="0" smtClean="0"/>
+              <a:t>Fitness Bands </a:t>
+            </a:r>
+          </a:p>
+          <a:p>
+            <a:r>
+              <a:rPr lang="en-GB" baseline="0" dirty="0" smtClean="0"/>
+              <a:t>Any device which is connected to the internet and can transfer data.  </a:t>
+            </a:r>
+          </a:p>
+        </p:txBody>
+      </p:sp>
+      <p:sp>
+        <p:nvSpPr>
+          <p:cNvPr id="4" name="Slide Number Placeholder 3"/>
+          <p:cNvSpPr>
+            <a:spLocks noGrp="1"/>
+          </p:cNvSpPr>
+          <p:nvPr>
+            <p:ph type="sldNum" sz="quarter" idx="10"/>
+          </p:nvPr>
+        </p:nvSpPr>
+        <p:spPr/>
+        <p:txBody>
+          <a:bodyPr/>
+          <a:lstStyle/>
+          <a:p>
+            <a:fld id="{E4773DDA-7232-1E41-9A12-ECB93A71EA0E}" type="slidenum">
+              <a:rPr lang="en-US" smtClean="0"/>
+              <a:pPr/>
+              <a:t>3</a:t>
+            </a:fld>
+            <a:endParaRPr lang="en-US"/>
+          </a:p>
+        </p:txBody>
+      </p:sp>
+    </p:spTree>
+    <p:extLst>
+      <p:ext uri="{BB962C8B-B14F-4D97-AF65-F5344CB8AC3E}">
+        <p14:creationId xmlns:p14="http://schemas.microsoft.com/office/powerpoint/2010/main" val="3634603392"/>
+      </p:ext>
+    </p:extLst>
+  </p:cSld>
+  <p:clrMapOvr>
+    <a:masterClrMapping/>
+  </p:clrMapOvr>
+</p:notes>
+</file>
+
+<file path=ppt/notesSlides/notesSlide3.xml><?xml version="1.0" encoding="utf-8"?>
+<p:notes xmlns:a="http://schemas.openxmlformats.org/drawingml/2006/main" xmlns:r="http://schemas.openxmlformats.org/officeDocument/2006/relationships" xmlns:p="http://schemas.openxmlformats.org/presentationml/2006/main">
+  <p:cSld>
+    <p:spTree>
+      <p:nvGrpSpPr>
+        <p:cNvPr id="1" name=""/>
+        <p:cNvGrpSpPr/>
+        <p:nvPr/>
+      </p:nvGrpSpPr>
+      <p:grpSpPr>
+        <a:xfrm>
+          <a:off x="0" y="0"/>
+          <a:ext cx="0" cy="0"/>
+          <a:chOff x="0" y="0"/>
+          <a:chExt cx="0" cy="0"/>
+        </a:xfrm>
+      </p:grpSpPr>
+      <p:sp>
+        <p:nvSpPr>
+          <p:cNvPr id="2" name="Slide Image Placeholder 1"/>
+          <p:cNvSpPr>
+            <a:spLocks noGrp="1" noRot="1" noChangeAspect="1"/>
+          </p:cNvSpPr>
+          <p:nvPr>
+            <p:ph type="sldImg"/>
+          </p:nvPr>
+        </p:nvSpPr>
+        <p:spPr/>
+      </p:sp>
+      <p:sp>
+        <p:nvSpPr>
+          <p:cNvPr id="3" name="Notes Placeholder 2"/>
+          <p:cNvSpPr>
+            <a:spLocks noGrp="1"/>
+          </p:cNvSpPr>
+          <p:nvPr>
+            <p:ph type="body" idx="1"/>
+          </p:nvPr>
+        </p:nvSpPr>
+        <p:spPr/>
+        <p:txBody>
+          <a:bodyPr/>
+          <a:lstStyle/>
+          <a:p>
+            <a:r>
+              <a:rPr lang="en-GB" dirty="0" smtClean="0"/>
+              <a:t>This</a:t>
+            </a:r>
+            <a:r>
+              <a:rPr lang="en-GB" baseline="0" dirty="0" smtClean="0"/>
+              <a:t> represents a huge market opportunity to control and manage all these devices and derive useful information from all </a:t>
+            </a:r>
+            <a:r>
+              <a:rPr lang="en-GB" baseline="0" smtClean="0"/>
+              <a:t>this data. </a:t>
+            </a:r>
+            <a:endParaRPr lang="en-US" dirty="0"/>
+          </a:p>
+        </p:txBody>
+      </p:sp>
+      <p:sp>
+        <p:nvSpPr>
+          <p:cNvPr id="4" name="Slide Number Placeholder 3"/>
+          <p:cNvSpPr>
+            <a:spLocks noGrp="1"/>
+          </p:cNvSpPr>
+          <p:nvPr>
+            <p:ph type="sldNum" sz="quarter" idx="10"/>
+          </p:nvPr>
+        </p:nvSpPr>
+        <p:spPr/>
+        <p:txBody>
+          <a:bodyPr/>
+          <a:lstStyle/>
+          <a:p>
+            <a:fld id="{E4773DDA-7232-1E41-9A12-ECB93A71EA0E}" type="slidenum">
+              <a:rPr lang="en-US" smtClean="0"/>
+              <a:pPr/>
+              <a:t>4</a:t>
+            </a:fld>
+            <a:endParaRPr lang="en-US"/>
+          </a:p>
+        </p:txBody>
+      </p:sp>
+    </p:spTree>
+    <p:extLst>
+      <p:ext uri="{BB962C8B-B14F-4D97-AF65-F5344CB8AC3E}">
+        <p14:creationId xmlns:p14="http://schemas.microsoft.com/office/powerpoint/2010/main" val="986396744"/>
+      </p:ext>
+    </p:extLst>
+  </p:cSld>
+  <p:clrMapOvr>
+    <a:masterClrMapping/>
+  </p:clrMapOvr>
+</p:notes>
+</file>
+
+<file path=ppt/notesSlides/notesSlide4.xml><?xml version="1.0" encoding="utf-8"?>
+<p:notes xmlns:a="http://schemas.openxmlformats.org/drawingml/2006/main" xmlns:r="http://schemas.openxmlformats.org/officeDocument/2006/relationships" xmlns:p="http://schemas.openxmlformats.org/presentationml/2006/main">
+  <p:cSld>
+    <p:spTree>
+      <p:nvGrpSpPr>
+        <p:cNvPr id="1" name=""/>
+        <p:cNvGrpSpPr/>
+        <p:nvPr/>
+      </p:nvGrpSpPr>
+      <p:grpSpPr>
+        <a:xfrm>
+          <a:off x="0" y="0"/>
+          <a:ext cx="0" cy="0"/>
+          <a:chOff x="0" y="0"/>
+          <a:chExt cx="0" cy="0"/>
+        </a:xfrm>
+      </p:grpSpPr>
+      <p:sp>
+        <p:nvSpPr>
+          <p:cNvPr id="2" name="Slide Image Placeholder 1"/>
+          <p:cNvSpPr>
+            <a:spLocks noGrp="1" noRot="1" noChangeAspect="1"/>
+          </p:cNvSpPr>
+          <p:nvPr>
+            <p:ph type="sldImg"/>
+          </p:nvPr>
+        </p:nvSpPr>
+        <p:spPr/>
+      </p:sp>
+      <p:sp>
+        <p:nvSpPr>
+          <p:cNvPr id="3" name="Notes Placeholder 2"/>
+          <p:cNvSpPr>
+            <a:spLocks noGrp="1"/>
+          </p:cNvSpPr>
+          <p:nvPr>
+            <p:ph type="body" idx="1"/>
+          </p:nvPr>
+        </p:nvSpPr>
+        <p:spPr/>
+        <p:txBody>
+          <a:bodyPr/>
+          <a:lstStyle/>
+          <a:p>
+            <a:r>
+              <a:rPr lang="en-GB" dirty="0" smtClean="0"/>
+              <a:t>It is often said</a:t>
+            </a:r>
+            <a:r>
+              <a:rPr lang="en-GB" baseline="0" dirty="0" smtClean="0"/>
+              <a:t> that IoT will eventually replace our conventional means to access the internet and discover information. </a:t>
+            </a:r>
+            <a:endParaRPr lang="en-US" dirty="0"/>
+          </a:p>
+        </p:txBody>
+      </p:sp>
+      <p:sp>
+        <p:nvSpPr>
+          <p:cNvPr id="4" name="Slide Number Placeholder 3"/>
+          <p:cNvSpPr>
+            <a:spLocks noGrp="1"/>
+          </p:cNvSpPr>
+          <p:nvPr>
+            <p:ph type="sldNum" sz="quarter" idx="10"/>
+          </p:nvPr>
+        </p:nvSpPr>
+        <p:spPr/>
+        <p:txBody>
+          <a:bodyPr/>
+          <a:lstStyle/>
+          <a:p>
+            <a:fld id="{E4773DDA-7232-1E41-9A12-ECB93A71EA0E}" type="slidenum">
+              <a:rPr lang="en-US" smtClean="0"/>
+              <a:pPr/>
+              <a:t>5</a:t>
+            </a:fld>
+            <a:endParaRPr lang="en-US"/>
+          </a:p>
+        </p:txBody>
+      </p:sp>
+    </p:spTree>
+    <p:extLst>
+      <p:ext uri="{BB962C8B-B14F-4D97-AF65-F5344CB8AC3E}">
+        <p14:creationId xmlns:p14="http://schemas.microsoft.com/office/powerpoint/2010/main" val="3304390826"/>
+      </p:ext>
+    </p:extLst>
+  </p:cSld>
+  <p:clrMapOvr>
+    <a:masterClrMapping/>
+  </p:clrMapOvr>
+</p:notes>
+</file>
+
+<file path=ppt/notesSlides/notesSlide5.xml><?xml version="1.0" encoding="utf-8"?>
+<p:notes xmlns:a="http://schemas.openxmlformats.org/drawingml/2006/main" xmlns:r="http://schemas.openxmlformats.org/officeDocument/2006/relationships" xmlns:p="http://schemas.openxmlformats.org/presentationml/2006/main">
+  <p:cSld>
+    <p:spTree>
+      <p:nvGrpSpPr>
+        <p:cNvPr id="1" name=""/>
+        <p:cNvGrpSpPr/>
+        <p:nvPr/>
+      </p:nvGrpSpPr>
+      <p:grpSpPr>
+        <a:xfrm>
+          <a:off x="0" y="0"/>
+          <a:ext cx="0" cy="0"/>
+          <a:chOff x="0" y="0"/>
+          <a:chExt cx="0" cy="0"/>
+        </a:xfrm>
+      </p:grpSpPr>
+      <p:sp>
+        <p:nvSpPr>
+          <p:cNvPr id="2" name="Slide Image Placeholder 1"/>
+          <p:cNvSpPr>
+            <a:spLocks noGrp="1" noRot="1" noChangeAspect="1"/>
+          </p:cNvSpPr>
+          <p:nvPr>
+            <p:ph type="sldImg"/>
+          </p:nvPr>
+        </p:nvSpPr>
+        <p:spPr/>
+      </p:sp>
+      <p:sp>
+        <p:nvSpPr>
+          <p:cNvPr id="3" name="Notes Placeholder 2"/>
+          <p:cNvSpPr>
+            <a:spLocks noGrp="1"/>
+          </p:cNvSpPr>
+          <p:nvPr>
+            <p:ph type="body" idx="1"/>
+          </p:nvPr>
+        </p:nvSpPr>
+        <p:spPr/>
+        <p:txBody>
+          <a:bodyPr/>
+          <a:lstStyle/>
+          <a:p>
+            <a:r>
               <a:rPr lang="en-GB" sz="1200" dirty="0" smtClean="0">
                 <a:latin typeface="Trade Gothic Next LT Pro Lt" charset="0"/>
               </a:rPr>
-              <a:t>While the costs of sensors and actuators go down, more and more devices will integrate them into their systems</a:t>
+              <a:t>2. While </a:t>
+            </a:r>
+            <a:r>
+              <a:rPr lang="en-GB" sz="1200" dirty="0" smtClean="0">
+                <a:latin typeface="Trade Gothic Next LT Pro Lt" charset="0"/>
+              </a:rPr>
+              <a:t>the costs of sensors and actuators go down, more and more devices will integrate them into their </a:t>
+            </a:r>
+            <a:r>
+              <a:rPr lang="en-GB" sz="1200" dirty="0" smtClean="0">
+                <a:latin typeface="Trade Gothic Next LT Pro Lt" charset="0"/>
+              </a:rPr>
+              <a:t>systems. </a:t>
+            </a:r>
+          </a:p>
+          <a:p>
+            <a:endParaRPr lang="en-GB" sz="1200" dirty="0" smtClean="0">
+              <a:latin typeface="Trade Gothic Next LT Pro Lt" charset="0"/>
+            </a:endParaRPr>
+          </a:p>
+          <a:p>
+            <a:r>
+              <a:rPr lang="en-GB" sz="1200" dirty="0" smtClean="0">
+                <a:latin typeface="Trade Gothic Next LT Pro Lt" charset="0"/>
+              </a:rPr>
+              <a:t>3.We</a:t>
+            </a:r>
+            <a:r>
+              <a:rPr lang="en-GB" sz="1200" baseline="0" dirty="0" smtClean="0">
+                <a:latin typeface="Trade Gothic Next LT Pro Lt" charset="0"/>
+              </a:rPr>
+              <a:t> already have appliances which are smart but IoT will take this further with for example fridges that analyse the food within it and calculate when you next need to do shopping. </a:t>
+            </a:r>
+          </a:p>
+          <a:p>
+            <a:endParaRPr lang="en-GB" sz="1200" baseline="0" dirty="0" smtClean="0">
+              <a:latin typeface="Trade Gothic Next LT Pro Lt" charset="0"/>
+            </a:endParaRPr>
+          </a:p>
+          <a:p>
+            <a:r>
+              <a:rPr lang="en-GB" sz="1200" baseline="0" dirty="0" smtClean="0">
+                <a:latin typeface="Trade Gothic Next LT Pro Lt" charset="0"/>
+              </a:rPr>
+              <a:t>4. No longer broad systems which attempts to satisfy everyone but a different version of a system to tailor to each individual. </a:t>
+            </a:r>
+          </a:p>
+          <a:p>
+            <a:endParaRPr lang="en-GB" sz="1200" baseline="0" dirty="0" smtClean="0">
+              <a:latin typeface="Trade Gothic Next LT Pro Lt" charset="0"/>
+            </a:endParaRPr>
+          </a:p>
+          <a:p>
+            <a:r>
+              <a:rPr lang="en-GB" sz="1200" baseline="0" dirty="0" smtClean="0">
+                <a:latin typeface="Trade Gothic Next LT Pro Lt" charset="0"/>
+              </a:rPr>
+              <a:t>5. Tech companies are already coming out with fitness trackers but now there is talk of smart clothing. Clothing with sensors which will track and monitor your health in a real time basis and detect if anything will go wrong before it has even happened. </a:t>
+            </a:r>
+          </a:p>
+          <a:p>
+            <a:endParaRPr lang="en-GB" sz="1200" baseline="0" dirty="0" smtClean="0">
+              <a:latin typeface="Trade Gothic Next LT Pro Lt" charset="0"/>
+            </a:endParaRPr>
+          </a:p>
+          <a:p>
+            <a:r>
+              <a:rPr lang="en-GB" sz="1200" baseline="0" dirty="0" smtClean="0">
+                <a:latin typeface="Trade Gothic Next LT Pro Lt" charset="0"/>
+              </a:rPr>
+              <a:t>6. Its better to understand IoT with a Use Case; [Read Use Case]</a:t>
+            </a:r>
+          </a:p>
+          <a:p>
+            <a:endParaRPr lang="en-GB" sz="1200" baseline="0" dirty="0" smtClean="0">
+              <a:latin typeface="Trade Gothic Next LT Pro Lt" charset="0"/>
+            </a:endParaRPr>
+          </a:p>
+        </p:txBody>
+      </p:sp>
+      <p:sp>
+        <p:nvSpPr>
+          <p:cNvPr id="4" name="Slide Number Placeholder 3"/>
+          <p:cNvSpPr>
+            <a:spLocks noGrp="1"/>
+          </p:cNvSpPr>
+          <p:nvPr>
+            <p:ph type="sldNum" sz="quarter" idx="10"/>
+          </p:nvPr>
+        </p:nvSpPr>
+        <p:spPr/>
+        <p:txBody>
+          <a:bodyPr/>
+          <a:lstStyle/>
+          <a:p>
+            <a:fld id="{E4773DDA-7232-1E41-9A12-ECB93A71EA0E}" type="slidenum">
+              <a:rPr lang="en-US" smtClean="0"/>
+              <a:pPr/>
+              <a:t>6</a:t>
+            </a:fld>
+            <a:endParaRPr lang="en-US"/>
+          </a:p>
+        </p:txBody>
+      </p:sp>
+    </p:spTree>
+    <p:extLst>
+      <p:ext uri="{BB962C8B-B14F-4D97-AF65-F5344CB8AC3E}">
+        <p14:creationId xmlns:p14="http://schemas.microsoft.com/office/powerpoint/2010/main" val="2162989649"/>
+      </p:ext>
+    </p:extLst>
+  </p:cSld>
+  <p:clrMapOvr>
+    <a:masterClrMapping/>
+  </p:clrMapOvr>
+</p:notes>
+</file>
+
+<file path=ppt/notesSlides/notesSlide6.xml><?xml version="1.0" encoding="utf-8"?>
+<p:notes xmlns:a="http://schemas.openxmlformats.org/drawingml/2006/main" xmlns:r="http://schemas.openxmlformats.org/officeDocument/2006/relationships" xmlns:p="http://schemas.openxmlformats.org/presentationml/2006/main">
+  <p:cSld>
+    <p:spTree>
+      <p:nvGrpSpPr>
+        <p:cNvPr id="1" name=""/>
+        <p:cNvGrpSpPr/>
+        <p:nvPr/>
+      </p:nvGrpSpPr>
+      <p:grpSpPr>
+        <a:xfrm>
+          <a:off x="0" y="0"/>
+          <a:ext cx="0" cy="0"/>
+          <a:chOff x="0" y="0"/>
+          <a:chExt cx="0" cy="0"/>
+        </a:xfrm>
+      </p:grpSpPr>
+      <p:sp>
+        <p:nvSpPr>
+          <p:cNvPr id="2" name="Slide Image Placeholder 1"/>
+          <p:cNvSpPr>
+            <a:spLocks noGrp="1" noRot="1" noChangeAspect="1"/>
+          </p:cNvSpPr>
+          <p:nvPr>
+            <p:ph type="sldImg"/>
+          </p:nvPr>
+        </p:nvSpPr>
+        <p:spPr/>
+      </p:sp>
+      <p:sp>
+        <p:nvSpPr>
+          <p:cNvPr id="3" name="Notes Placeholder 2"/>
+          <p:cNvSpPr>
+            <a:spLocks noGrp="1"/>
+          </p:cNvSpPr>
+          <p:nvPr>
+            <p:ph type="body" idx="1"/>
+          </p:nvPr>
+        </p:nvSpPr>
+        <p:spPr/>
+        <p:txBody>
+          <a:bodyPr/>
+          <a:lstStyle/>
+          <a:p>
+            <a:r>
+              <a:rPr lang="en-GB" dirty="0" smtClean="0"/>
+              <a:t>As well as domestic enhancements,</a:t>
+            </a:r>
+            <a:r>
+              <a:rPr lang="en-GB" baseline="0" dirty="0" smtClean="0"/>
+              <a:t> IoT will also revolutionise the workplace in the same way that computers and database’s did with the old paper based systems. </a:t>
+            </a:r>
+            <a:endParaRPr lang="en-US" dirty="0"/>
+          </a:p>
+        </p:txBody>
+      </p:sp>
+      <p:sp>
+        <p:nvSpPr>
+          <p:cNvPr id="4" name="Slide Number Placeholder 3"/>
+          <p:cNvSpPr>
+            <a:spLocks noGrp="1"/>
+          </p:cNvSpPr>
+          <p:nvPr>
+            <p:ph type="sldNum" sz="quarter" idx="10"/>
+          </p:nvPr>
+        </p:nvSpPr>
+        <p:spPr/>
+        <p:txBody>
+          <a:bodyPr/>
+          <a:lstStyle/>
+          <a:p>
+            <a:fld id="{E4773DDA-7232-1E41-9A12-ECB93A71EA0E}" type="slidenum">
+              <a:rPr lang="en-US" smtClean="0"/>
+              <a:pPr/>
+              <a:t>7</a:t>
+            </a:fld>
+            <a:endParaRPr lang="en-US"/>
+          </a:p>
+        </p:txBody>
+      </p:sp>
+    </p:spTree>
+    <p:extLst>
+      <p:ext uri="{BB962C8B-B14F-4D97-AF65-F5344CB8AC3E}">
+        <p14:creationId xmlns:p14="http://schemas.microsoft.com/office/powerpoint/2010/main" val="2300211472"/>
+      </p:ext>
+    </p:extLst>
+  </p:cSld>
+  <p:clrMapOvr>
+    <a:masterClrMapping/>
+  </p:clrMapOvr>
+</p:notes>
+</file>
+
+<file path=ppt/notesSlides/notesSlide7.xml><?xml version="1.0" encoding="utf-8"?>
+<p:notes xmlns:a="http://schemas.openxmlformats.org/drawingml/2006/main" xmlns:r="http://schemas.openxmlformats.org/officeDocument/2006/relationships" xmlns:p="http://schemas.openxmlformats.org/presentationml/2006/main">
+  <p:cSld>
+    <p:spTree>
+      <p:nvGrpSpPr>
+        <p:cNvPr id="1" name=""/>
+        <p:cNvGrpSpPr/>
+        <p:nvPr/>
+      </p:nvGrpSpPr>
+      <p:grpSpPr>
+        <a:xfrm>
+          <a:off x="0" y="0"/>
+          <a:ext cx="0" cy="0"/>
+          <a:chOff x="0" y="0"/>
+          <a:chExt cx="0" cy="0"/>
+        </a:xfrm>
+      </p:grpSpPr>
+      <p:sp>
+        <p:nvSpPr>
+          <p:cNvPr id="2" name="Slide Image Placeholder 1"/>
+          <p:cNvSpPr>
+            <a:spLocks noGrp="1" noRot="1" noChangeAspect="1"/>
+          </p:cNvSpPr>
+          <p:nvPr>
+            <p:ph type="sldImg"/>
+          </p:nvPr>
+        </p:nvSpPr>
+        <p:spPr/>
+      </p:sp>
+      <p:sp>
+        <p:nvSpPr>
+          <p:cNvPr id="3" name="Notes Placeholder 2"/>
+          <p:cNvSpPr>
+            <a:spLocks noGrp="1"/>
+          </p:cNvSpPr>
+          <p:nvPr>
+            <p:ph type="body" idx="1"/>
+          </p:nvPr>
+        </p:nvSpPr>
+        <p:spPr/>
+        <p:txBody>
+          <a:bodyPr/>
+          <a:lstStyle/>
+          <a:p>
+            <a:r>
+              <a:rPr lang="en-GB" dirty="0" smtClean="0"/>
+              <a:t>2.</a:t>
+            </a:r>
+            <a:r>
+              <a:rPr lang="en-GB" baseline="0" dirty="0" smtClean="0"/>
+              <a:t> Here are a few examples of how it can be made applicable to an office </a:t>
+            </a:r>
+            <a:r>
+              <a:rPr lang="en-GB" baseline="0" dirty="0" err="1" smtClean="0"/>
+              <a:t>enviroment</a:t>
+            </a:r>
+            <a:r>
+              <a:rPr lang="en-GB" baseline="0" dirty="0" smtClean="0"/>
+              <a:t>. </a:t>
+            </a:r>
+          </a:p>
+          <a:p>
+            <a:endParaRPr lang="en-GB" baseline="0" dirty="0" smtClean="0"/>
+          </a:p>
+          <a:p>
+            <a:r>
+              <a:rPr lang="en-GB" baseline="0" dirty="0" smtClean="0"/>
+              <a:t>2. Eventually we will have a building wide system that integrates with the whole building to boost </a:t>
+            </a:r>
+            <a:r>
+              <a:rPr lang="en-GB" baseline="0" dirty="0" err="1" smtClean="0"/>
+              <a:t>efficency</a:t>
+            </a:r>
+            <a:r>
+              <a:rPr lang="en-GB" baseline="0" dirty="0" smtClean="0"/>
+              <a:t> and savings. </a:t>
+            </a:r>
+          </a:p>
+          <a:p>
+            <a:endParaRPr lang="en-GB" baseline="0" dirty="0" smtClean="0"/>
+          </a:p>
+          <a:p>
+            <a:r>
+              <a:rPr lang="en-GB" baseline="0" dirty="0" smtClean="0"/>
+              <a:t>3. Business’s and the people doing their job will be allowed to focus on their job and allow the system to do the small jobs involved on a daily bases. </a:t>
+            </a:r>
+          </a:p>
+          <a:p>
+            <a:endParaRPr lang="en-GB" baseline="0" dirty="0" smtClean="0"/>
+          </a:p>
+          <a:p>
+            <a:r>
+              <a:rPr lang="en-GB" baseline="0" dirty="0" smtClean="0"/>
+              <a:t>4. And here is a typical use case for our office here. [Read Use Case]. </a:t>
             </a:r>
             <a:endParaRPr lang="en-US" dirty="0"/>
           </a:p>
@@ -659,7 +1436,215 @@
     </p:spTree>
     <p:extLst>
       <p:ext uri="{BB962C8B-B14F-4D97-AF65-F5344CB8AC3E}">
-        <p14:creationId xmlns:p14="http://schemas.microsoft.com/office/powerpoint/2010/main" xmlns="" val="2162989649"/>
+        <p14:creationId xmlns:p14="http://schemas.microsoft.com/office/powerpoint/2010/main" val="2162989649"/>
+      </p:ext>
+    </p:extLst>
+  </p:cSld>
+  <p:clrMapOvr>
+    <a:masterClrMapping/>
+  </p:clrMapOvr>
+</p:notes>
+</file>
+
+<file path=ppt/notesSlides/notesSlide8.xml><?xml version="1.0" encoding="utf-8"?>
+<p:notes xmlns:a="http://schemas.openxmlformats.org/drawingml/2006/main" xmlns:r="http://schemas.openxmlformats.org/officeDocument/2006/relationships" xmlns:p="http://schemas.openxmlformats.org/presentationml/2006/main">
+  <p:cSld>
+    <p:spTree>
+      <p:nvGrpSpPr>
+        <p:cNvPr id="1" name=""/>
+        <p:cNvGrpSpPr/>
+        <p:nvPr/>
+      </p:nvGrpSpPr>
+      <p:grpSpPr>
+        <a:xfrm>
+          <a:off x="0" y="0"/>
+          <a:ext cx="0" cy="0"/>
+          <a:chOff x="0" y="0"/>
+          <a:chExt cx="0" cy="0"/>
+        </a:xfrm>
+      </p:grpSpPr>
+      <p:sp>
+        <p:nvSpPr>
+          <p:cNvPr id="2" name="Slide Image Placeholder 1"/>
+          <p:cNvSpPr>
+            <a:spLocks noGrp="1" noRot="1" noChangeAspect="1"/>
+          </p:cNvSpPr>
+          <p:nvPr>
+            <p:ph type="sldImg"/>
+          </p:nvPr>
+        </p:nvSpPr>
+        <p:spPr/>
+      </p:sp>
+      <p:sp>
+        <p:nvSpPr>
+          <p:cNvPr id="3" name="Notes Placeholder 2"/>
+          <p:cNvSpPr>
+            <a:spLocks noGrp="1"/>
+          </p:cNvSpPr>
+          <p:nvPr>
+            <p:ph type="body" idx="1"/>
+          </p:nvPr>
+        </p:nvSpPr>
+        <p:spPr/>
+        <p:txBody>
+          <a:bodyPr/>
+          <a:lstStyle/>
+          <a:p>
+            <a:r>
+              <a:rPr lang="en-GB" dirty="0" smtClean="0"/>
+              <a:t>Project Ion</a:t>
+            </a:r>
+            <a:r>
+              <a:rPr lang="en-GB" baseline="0" dirty="0" smtClean="0"/>
+              <a:t> is the internal name of the IoT project that was announced in May. It comes at a opportunist time as the market for IoT has just been recently growing. IoT is still in its infancy with 2014 largely being considered ‘The Year Of The Internet Of Things’. </a:t>
+            </a:r>
+          </a:p>
+          <a:p>
+            <a:endParaRPr lang="en-GB" baseline="0" dirty="0" smtClean="0"/>
+          </a:p>
+          <a:p>
+            <a:endParaRPr lang="en-US" dirty="0"/>
+          </a:p>
+        </p:txBody>
+      </p:sp>
+      <p:sp>
+        <p:nvSpPr>
+          <p:cNvPr id="4" name="Slide Number Placeholder 3"/>
+          <p:cNvSpPr>
+            <a:spLocks noGrp="1"/>
+          </p:cNvSpPr>
+          <p:nvPr>
+            <p:ph type="sldNum" sz="quarter" idx="10"/>
+          </p:nvPr>
+        </p:nvSpPr>
+        <p:spPr/>
+        <p:txBody>
+          <a:bodyPr/>
+          <a:lstStyle/>
+          <a:p>
+            <a:fld id="{E4773DDA-7232-1E41-9A12-ECB93A71EA0E}" type="slidenum">
+              <a:rPr lang="en-US" smtClean="0"/>
+              <a:pPr/>
+              <a:t>9</a:t>
+            </a:fld>
+            <a:endParaRPr lang="en-US"/>
+          </a:p>
+        </p:txBody>
+      </p:sp>
+    </p:spTree>
+    <p:extLst>
+      <p:ext uri="{BB962C8B-B14F-4D97-AF65-F5344CB8AC3E}">
+        <p14:creationId xmlns:p14="http://schemas.microsoft.com/office/powerpoint/2010/main" val="4159798753"/>
+      </p:ext>
+    </p:extLst>
+  </p:cSld>
+  <p:clrMapOvr>
+    <a:masterClrMapping/>
+  </p:clrMapOvr>
+</p:notes>
+</file>
+
+<file path=ppt/notesSlides/notesSlide9.xml><?xml version="1.0" encoding="utf-8"?>
+<p:notes xmlns:a="http://schemas.openxmlformats.org/drawingml/2006/main" xmlns:r="http://schemas.openxmlformats.org/officeDocument/2006/relationships" xmlns:p="http://schemas.openxmlformats.org/presentationml/2006/main">
+  <p:cSld>
+    <p:spTree>
+      <p:nvGrpSpPr>
+        <p:cNvPr id="1" name=""/>
+        <p:cNvGrpSpPr/>
+        <p:nvPr/>
+      </p:nvGrpSpPr>
+      <p:grpSpPr>
+        <a:xfrm>
+          <a:off x="0" y="0"/>
+          <a:ext cx="0" cy="0"/>
+          <a:chOff x="0" y="0"/>
+          <a:chExt cx="0" cy="0"/>
+        </a:xfrm>
+      </p:grpSpPr>
+      <p:sp>
+        <p:nvSpPr>
+          <p:cNvPr id="2" name="Slide Image Placeholder 1"/>
+          <p:cNvSpPr>
+            <a:spLocks noGrp="1" noRot="1" noChangeAspect="1"/>
+          </p:cNvSpPr>
+          <p:nvPr>
+            <p:ph type="sldImg"/>
+          </p:nvPr>
+        </p:nvSpPr>
+        <p:spPr/>
+      </p:sp>
+      <p:sp>
+        <p:nvSpPr>
+          <p:cNvPr id="3" name="Notes Placeholder 2"/>
+          <p:cNvSpPr>
+            <a:spLocks noGrp="1"/>
+          </p:cNvSpPr>
+          <p:nvPr>
+            <p:ph type="body" idx="1"/>
+          </p:nvPr>
+        </p:nvSpPr>
+        <p:spPr/>
+        <p:txBody>
+          <a:bodyPr/>
+          <a:lstStyle/>
+          <a:p>
+            <a:r>
+              <a:rPr lang="en-GB" dirty="0" smtClean="0"/>
+              <a:t>QNX platform is on a wide</a:t>
+            </a:r>
+            <a:r>
+              <a:rPr lang="en-GB" baseline="0" dirty="0" smtClean="0"/>
+              <a:t> range of technology already running it. John Chen now envisages the platform to extend to more and more devices to provide a secure, reliable infrastructure. </a:t>
+            </a:r>
+          </a:p>
+          <a:p>
+            <a:endParaRPr lang="en-GB" baseline="0" dirty="0" smtClean="0"/>
+          </a:p>
+          <a:p>
+            <a:r>
+              <a:rPr lang="en-GB" baseline="0" dirty="0" smtClean="0"/>
+              <a:t>At the moment IoT doesn't really have a good infrastructure in where many different devices can be connected together and be compatible together. Ion aims to solve this problem and provide the connective tissue between devices and machine to machine processing whilst boosting BlackBerry level encryption and reliability. </a:t>
+            </a:r>
+          </a:p>
+          <a:p>
+            <a:endParaRPr lang="en-GB" baseline="0" dirty="0" smtClean="0"/>
+          </a:p>
+          <a:p>
+            <a:r>
+              <a:rPr lang="en-GB" baseline="0" dirty="0" smtClean="0"/>
+              <a:t>This market is really just in its infancy and if BlackBerry becomes the infrastructure to support other companies just as it did with Enterprise then it could become a market leader in IoT solutions. </a:t>
+            </a:r>
+          </a:p>
+        </p:txBody>
+      </p:sp>
+      <p:sp>
+        <p:nvSpPr>
+          <p:cNvPr id="4" name="Slide Number Placeholder 3"/>
+          <p:cNvSpPr>
+            <a:spLocks noGrp="1"/>
+          </p:cNvSpPr>
+          <p:nvPr>
+            <p:ph type="sldNum" sz="quarter" idx="10"/>
+          </p:nvPr>
+        </p:nvSpPr>
+        <p:spPr/>
+        <p:txBody>
+          <a:bodyPr/>
+          <a:lstStyle/>
+          <a:p>
+            <a:fld id="{E4773DDA-7232-1E41-9A12-ECB93A71EA0E}" type="slidenum">
+              <a:rPr lang="en-US" smtClean="0"/>
+              <a:pPr/>
+              <a:t>10</a:t>
+            </a:fld>
+            <a:endParaRPr lang="en-US"/>
+          </a:p>
+        </p:txBody>
+      </p:sp>
+    </p:spTree>
+    <p:extLst>
+      <p:ext uri="{BB962C8B-B14F-4D97-AF65-F5344CB8AC3E}">
+        <p14:creationId xmlns:p14="http://schemas.microsoft.com/office/powerpoint/2010/main" val="2846872074"/>
       </p:ext>
     </p:extLst>
   </p:cSld>
@@ -689,7 +1674,7 @@
     </p:spTree>
     <p:extLst>
       <p:ext uri="{BB962C8B-B14F-4D97-AF65-F5344CB8AC3E}">
-        <p14:creationId xmlns:p14="http://schemas.microsoft.com/office/powerpoint/2010/main" xmlns="" val="3260163533"/>
+        <p14:creationId xmlns:p14="http://schemas.microsoft.com/office/powerpoint/2010/main" val="3260163533"/>
       </p:ext>
     </p:extLst>
   </p:cSld>
@@ -719,7 +1704,7 @@
     </p:spTree>
     <p:extLst>
       <p:ext uri="{BB962C8B-B14F-4D97-AF65-F5344CB8AC3E}">
-        <p14:creationId xmlns:p14="http://schemas.microsoft.com/office/powerpoint/2010/main" xmlns="" val="89236429"/>
+        <p14:creationId xmlns:p14="http://schemas.microsoft.com/office/powerpoint/2010/main" val="89236429"/>
       </p:ext>
     </p:extLst>
   </p:cSld>
@@ -749,7 +1734,7 @@
     </p:spTree>
     <p:extLst>
       <p:ext uri="{BB962C8B-B14F-4D97-AF65-F5344CB8AC3E}">
-        <p14:creationId xmlns:p14="http://schemas.microsoft.com/office/powerpoint/2010/main" xmlns="" val="392054391"/>
+        <p14:creationId xmlns:p14="http://schemas.microsoft.com/office/powerpoint/2010/main" val="392054391"/>
       </p:ext>
     </p:extLst>
   </p:cSld>
@@ -779,7 +1764,7 @@
     </p:spTree>
     <p:extLst>
       <p:ext uri="{BB962C8B-B14F-4D97-AF65-F5344CB8AC3E}">
-        <p14:creationId xmlns:p14="http://schemas.microsoft.com/office/powerpoint/2010/main" xmlns="" val="2301198650"/>
+        <p14:creationId xmlns:p14="http://schemas.microsoft.com/office/powerpoint/2010/main" val="2301198650"/>
       </p:ext>
     </p:extLst>
   </p:cSld>
@@ -809,7 +1794,7 @@
     </p:spTree>
     <p:extLst>
       <p:ext uri="{BB962C8B-B14F-4D97-AF65-F5344CB8AC3E}">
-        <p14:creationId xmlns:p14="http://schemas.microsoft.com/office/powerpoint/2010/main" xmlns="" val="392777403"/>
+        <p14:creationId xmlns:p14="http://schemas.microsoft.com/office/powerpoint/2010/main" val="392777403"/>
       </p:ext>
     </p:extLst>
   </p:cSld>
@@ -839,7 +1824,7 @@
     </p:spTree>
     <p:extLst>
       <p:ext uri="{BB962C8B-B14F-4D97-AF65-F5344CB8AC3E}">
-        <p14:creationId xmlns:p14="http://schemas.microsoft.com/office/powerpoint/2010/main" xmlns="" val="340223829"/>
+        <p14:creationId xmlns:p14="http://schemas.microsoft.com/office/powerpoint/2010/main" val="340223829"/>
       </p:ext>
     </p:extLst>
   </p:cSld>
@@ -869,7 +1854,7 @@
     </p:spTree>
     <p:extLst>
       <p:ext uri="{BB962C8B-B14F-4D97-AF65-F5344CB8AC3E}">
-        <p14:creationId xmlns:p14="http://schemas.microsoft.com/office/powerpoint/2010/main" xmlns="" val="1382689729"/>
+        <p14:creationId xmlns:p14="http://schemas.microsoft.com/office/powerpoint/2010/main" val="1382689729"/>
       </p:ext>
     </p:extLst>
   </p:cSld>
@@ -899,7 +1884,7 @@
     </p:spTree>
     <p:extLst>
       <p:ext uri="{BB962C8B-B14F-4D97-AF65-F5344CB8AC3E}">
-        <p14:creationId xmlns:p14="http://schemas.microsoft.com/office/powerpoint/2010/main" xmlns="" val="209956025"/>
+        <p14:creationId xmlns:p14="http://schemas.microsoft.com/office/powerpoint/2010/main" val="209956025"/>
       </p:ext>
     </p:extLst>
   </p:cSld>
@@ -929,7 +1914,7 @@
     </p:spTree>
     <p:extLst>
       <p:ext uri="{BB962C8B-B14F-4D97-AF65-F5344CB8AC3E}">
-        <p14:creationId xmlns:p14="http://schemas.microsoft.com/office/powerpoint/2010/main" xmlns="" val="2670387925"/>
+        <p14:creationId xmlns:p14="http://schemas.microsoft.com/office/powerpoint/2010/main" val="2670387925"/>
       </p:ext>
     </p:extLst>
   </p:cSld>
@@ -959,7 +1944,7 @@
     </p:spTree>
     <p:extLst>
       <p:ext uri="{BB962C8B-B14F-4D97-AF65-F5344CB8AC3E}">
-        <p14:creationId xmlns:p14="http://schemas.microsoft.com/office/powerpoint/2010/main" xmlns="" val="2479430595"/>
+        <p14:creationId xmlns:p14="http://schemas.microsoft.com/office/powerpoint/2010/main" val="2479430595"/>
       </p:ext>
     </p:extLst>
   </p:cSld>
@@ -989,7 +1974,7 @@
     </p:spTree>
     <p:extLst>
       <p:ext uri="{BB962C8B-B14F-4D97-AF65-F5344CB8AC3E}">
-        <p14:creationId xmlns:p14="http://schemas.microsoft.com/office/powerpoint/2010/main" xmlns="" val="2072677224"/>
+        <p14:creationId xmlns:p14="http://schemas.microsoft.com/office/powerpoint/2010/main" val="2072677224"/>
       </p:ext>
     </p:extLst>
   </p:cSld>
@@ -1019,7 +2004,7 @@
     </p:spTree>
     <p:extLst>
       <p:ext uri="{BB962C8B-B14F-4D97-AF65-F5344CB8AC3E}">
-        <p14:creationId xmlns:p14="http://schemas.microsoft.com/office/powerpoint/2010/main" xmlns="" val="1429586413"/>
+        <p14:creationId xmlns:p14="http://schemas.microsoft.com/office/powerpoint/2010/main" val="1429586413"/>
       </p:ext>
     </p:extLst>
   </p:cSld>
@@ -1049,7 +2034,7 @@
     </p:spTree>
     <p:extLst>
       <p:ext uri="{BB962C8B-B14F-4D97-AF65-F5344CB8AC3E}">
-        <p14:creationId xmlns:p14="http://schemas.microsoft.com/office/powerpoint/2010/main" xmlns="" val="52914360"/>
+        <p14:creationId xmlns:p14="http://schemas.microsoft.com/office/powerpoint/2010/main" val="52914360"/>
       </p:ext>
     </p:extLst>
   </p:cSld>
@@ -1079,7 +2064,7 @@
     </p:spTree>
     <p:extLst>
       <p:ext uri="{BB962C8B-B14F-4D97-AF65-F5344CB8AC3E}">
-        <p14:creationId xmlns:p14="http://schemas.microsoft.com/office/powerpoint/2010/main" xmlns="" val="2544618454"/>
+        <p14:creationId xmlns:p14="http://schemas.microsoft.com/office/powerpoint/2010/main" val="2544618454"/>
       </p:ext>
     </p:extLst>
   </p:cSld>
@@ -1109,7 +2094,7 @@
     </p:spTree>
     <p:extLst>
       <p:ext uri="{BB962C8B-B14F-4D97-AF65-F5344CB8AC3E}">
-        <p14:creationId xmlns:p14="http://schemas.microsoft.com/office/powerpoint/2010/main" xmlns="" val="1232405455"/>
+        <p14:creationId xmlns:p14="http://schemas.microsoft.com/office/powerpoint/2010/main" val="1232405455"/>
       </p:ext>
     </p:extLst>
   </p:cSld>
@@ -1231,7 +2216,7 @@
               <a:pPr eaLnBrk="0" hangingPunct="0">
                 <a:defRPr/>
               </a:pPr>
-              <a:t>07 August 2014</a:t>
+              <a:t>08 August 2014</a:t>
             </a:fld>
             <a:endParaRPr lang="en-US" sz="900" dirty="0">
               <a:solidFill>
@@ -1324,7 +2309,7 @@
     </p:spTree>
     <p:extLst>
       <p:ext uri="{BB962C8B-B14F-4D97-AF65-F5344CB8AC3E}">
-        <p14:creationId xmlns:p14="http://schemas.microsoft.com/office/powerpoint/2010/main" xmlns="" val="2050965234"/>
+        <p14:creationId xmlns:p14="http://schemas.microsoft.com/office/powerpoint/2010/main" val="2050965234"/>
       </p:ext>
     </p:extLst>
   </p:cSld>
@@ -1619,7 +2604,7 @@
           <a:blip r:embed="rId3" cstate="screen">
             <a:extLst>
               <a:ext uri="{28A0092B-C50C-407E-A947-70E740481C1C}">
-                <a14:useLocalDpi xmlns:a14="http://schemas.microsoft.com/office/drawing/2010/main" xmlns=""/>
+                <a14:useLocalDpi xmlns:a14="http://schemas.microsoft.com/office/drawing/2010/main"/>
               </a:ext>
             </a:extLst>
           </a:blip>
@@ -1735,7 +2720,7 @@
               <a:pPr eaLnBrk="0" hangingPunct="0">
                 <a:defRPr/>
               </a:pPr>
-              <a:t>07 August 2014</a:t>
+              <a:t>08 August 2014</a:t>
             </a:fld>
             <a:endParaRPr lang="en-US" sz="900" dirty="0">
               <a:solidFill>
@@ -1828,7 +2813,7 @@
     </p:spTree>
     <p:extLst>
       <p:ext uri="{BB962C8B-B14F-4D97-AF65-F5344CB8AC3E}">
-        <p14:creationId xmlns:p14="http://schemas.microsoft.com/office/powerpoint/2010/main" xmlns="" val="4010067518"/>
+        <p14:creationId xmlns:p14="http://schemas.microsoft.com/office/powerpoint/2010/main" val="4010067518"/>
       </p:ext>
     </p:extLst>
   </p:cSld>
@@ -2123,7 +3108,7 @@
           <a:blip r:embed="rId3">
             <a:extLst>
               <a:ext uri="{28A0092B-C50C-407E-A947-70E740481C1C}">
-                <a14:useLocalDpi xmlns:a14="http://schemas.microsoft.com/office/drawing/2010/main" xmlns=""/>
+                <a14:useLocalDpi xmlns:a14="http://schemas.microsoft.com/office/drawing/2010/main"/>
               </a:ext>
             </a:extLst>
           </a:blip>
@@ -2231,7 +3216,7 @@
               <a:pPr eaLnBrk="0" hangingPunct="0">
                 <a:defRPr/>
               </a:pPr>
-              <a:t>07 August 2014</a:t>
+              <a:t>08 August 2014</a:t>
             </a:fld>
             <a:endParaRPr lang="en-US" sz="900" dirty="0">
               <a:solidFill>
@@ -2324,7 +3309,7 @@
     </p:spTree>
     <p:extLst>
       <p:ext uri="{BB962C8B-B14F-4D97-AF65-F5344CB8AC3E}">
-        <p14:creationId xmlns:p14="http://schemas.microsoft.com/office/powerpoint/2010/main" xmlns="" val="3828802584"/>
+        <p14:creationId xmlns:p14="http://schemas.microsoft.com/office/powerpoint/2010/main" val="3828802584"/>
       </p:ext>
     </p:extLst>
   </p:cSld>
@@ -2619,7 +3604,7 @@
           <a:blip r:embed="rId3" cstate="print">
             <a:extLst>
               <a:ext uri="{28A0092B-C50C-407E-A947-70E740481C1C}">
-                <a14:useLocalDpi xmlns:a14="http://schemas.microsoft.com/office/drawing/2010/main" xmlns=""/>
+                <a14:useLocalDpi xmlns:a14="http://schemas.microsoft.com/office/drawing/2010/main"/>
               </a:ext>
             </a:extLst>
           </a:blip>
@@ -2637,7 +3622,7 @@
           <a:noFill/>
           <a:extLst>
             <a:ext uri="{909E8E84-426E-40DD-AFC4-6F175D3DCCD1}">
-              <a14:hiddenFill xmlns:a14="http://schemas.microsoft.com/office/drawing/2010/main" xmlns="">
+              <a14:hiddenFill xmlns:a14="http://schemas.microsoft.com/office/drawing/2010/main">
                 <a:solidFill>
                   <a:srgbClr val="FFFFFF"/>
                 </a:solidFill>
@@ -2736,7 +3721,7 @@
               <a:pPr eaLnBrk="0" hangingPunct="0">
                 <a:defRPr/>
               </a:pPr>
-              <a:t>07 August 2014</a:t>
+              <a:t>08 August 2014</a:t>
             </a:fld>
             <a:endParaRPr lang="en-US" sz="900" dirty="0">
               <a:solidFill>
@@ -2829,7 +3814,7 @@
     </p:spTree>
     <p:extLst>
       <p:ext uri="{BB962C8B-B14F-4D97-AF65-F5344CB8AC3E}">
-        <p14:creationId xmlns:p14="http://schemas.microsoft.com/office/powerpoint/2010/main" xmlns="" val="2118938681"/>
+        <p14:creationId xmlns:p14="http://schemas.microsoft.com/office/powerpoint/2010/main" val="2118938681"/>
       </p:ext>
     </p:extLst>
   </p:cSld>
@@ -3124,7 +4109,7 @@
           <a:blip r:embed="rId3">
             <a:extLst>
               <a:ext uri="{28A0092B-C50C-407E-A947-70E740481C1C}">
-                <a14:useLocalDpi xmlns:a14="http://schemas.microsoft.com/office/drawing/2010/main" xmlns=""/>
+                <a14:useLocalDpi xmlns:a14="http://schemas.microsoft.com/office/drawing/2010/main"/>
               </a:ext>
             </a:extLst>
           </a:blip>
@@ -3232,7 +4217,7 @@
               <a:pPr eaLnBrk="0" hangingPunct="0">
                 <a:defRPr/>
               </a:pPr>
-              <a:t>07 August 2014</a:t>
+              <a:t>08 August 2014</a:t>
             </a:fld>
             <a:endParaRPr lang="en-US" sz="900" dirty="0">
               <a:solidFill>
@@ -3325,7 +4310,7 @@
     </p:spTree>
     <p:extLst>
       <p:ext uri="{BB962C8B-B14F-4D97-AF65-F5344CB8AC3E}">
-        <p14:creationId xmlns:p14="http://schemas.microsoft.com/office/powerpoint/2010/main" xmlns="" val="1243256026"/>
+        <p14:creationId xmlns:p14="http://schemas.microsoft.com/office/powerpoint/2010/main" val="1243256026"/>
       </p:ext>
     </p:extLst>
   </p:cSld>
@@ -3620,7 +4605,7 @@
           <a:blip r:embed="rId3">
             <a:extLst>
               <a:ext uri="{28A0092B-C50C-407E-A947-70E740481C1C}">
-                <a14:useLocalDpi xmlns:a14="http://schemas.microsoft.com/office/drawing/2010/main" xmlns=""/>
+                <a14:useLocalDpi xmlns:a14="http://schemas.microsoft.com/office/drawing/2010/main"/>
               </a:ext>
             </a:extLst>
           </a:blip>
@@ -3728,7 +4713,7 @@
               <a:pPr eaLnBrk="0" hangingPunct="0">
                 <a:defRPr/>
               </a:pPr>
-              <a:t>07 August 2014</a:t>
+              <a:t>08 August 2014</a:t>
             </a:fld>
             <a:endParaRPr lang="en-US" sz="900" dirty="0">
               <a:solidFill>
@@ -3821,7 +4806,7 @@
     </p:spTree>
     <p:extLst>
       <p:ext uri="{BB962C8B-B14F-4D97-AF65-F5344CB8AC3E}">
-        <p14:creationId xmlns:p14="http://schemas.microsoft.com/office/powerpoint/2010/main" xmlns="" val="1309289695"/>
+        <p14:creationId xmlns:p14="http://schemas.microsoft.com/office/powerpoint/2010/main" val="1309289695"/>
       </p:ext>
     </p:extLst>
   </p:cSld>
@@ -4116,7 +5101,7 @@
           <a:blip r:embed="rId3">
             <a:extLst>
               <a:ext uri="{28A0092B-C50C-407E-A947-70E740481C1C}">
-                <a14:useLocalDpi xmlns:a14="http://schemas.microsoft.com/office/drawing/2010/main" xmlns=""/>
+                <a14:useLocalDpi xmlns:a14="http://schemas.microsoft.com/office/drawing/2010/main"/>
               </a:ext>
             </a:extLst>
           </a:blip>
@@ -4224,7 +5209,7 @@
               <a:pPr eaLnBrk="0" hangingPunct="0">
                 <a:defRPr/>
               </a:pPr>
-              <a:t>07 August 2014</a:t>
+              <a:t>08 August 2014</a:t>
             </a:fld>
             <a:endParaRPr lang="en-US" sz="900" dirty="0">
               <a:solidFill>
@@ -4317,7 +5302,7 @@
     </p:spTree>
     <p:extLst>
       <p:ext uri="{BB962C8B-B14F-4D97-AF65-F5344CB8AC3E}">
-        <p14:creationId xmlns:p14="http://schemas.microsoft.com/office/powerpoint/2010/main" xmlns="" val="3968948287"/>
+        <p14:creationId xmlns:p14="http://schemas.microsoft.com/office/powerpoint/2010/main" val="3968948287"/>
       </p:ext>
     </p:extLst>
   </p:cSld>
@@ -4690,7 +5675,7 @@
               <a:pPr eaLnBrk="0" hangingPunct="0">
                 <a:defRPr/>
               </a:pPr>
-              <a:t>07 August 2014</a:t>
+              <a:t>08 August 2014</a:t>
             </a:fld>
             <a:endParaRPr lang="en-US" sz="900" dirty="0">
               <a:solidFill>
@@ -4792,7 +5777,7 @@
           <a:blip r:embed="rId4" cstate="screen">
             <a:extLst>
               <a:ext uri="{28A0092B-C50C-407E-A947-70E740481C1C}">
-                <a14:useLocalDpi xmlns:a14="http://schemas.microsoft.com/office/drawing/2010/main" xmlns=""/>
+                <a14:useLocalDpi xmlns:a14="http://schemas.microsoft.com/office/drawing/2010/main"/>
               </a:ext>
             </a:extLst>
           </a:blip>
@@ -4821,7 +5806,7 @@
     </p:spTree>
     <p:extLst>
       <p:ext uri="{BB962C8B-B14F-4D97-AF65-F5344CB8AC3E}">
-        <p14:creationId xmlns:p14="http://schemas.microsoft.com/office/powerpoint/2010/main" xmlns="" val="367642722"/>
+        <p14:creationId xmlns:p14="http://schemas.microsoft.com/office/powerpoint/2010/main" val="367642722"/>
       </p:ext>
     </p:extLst>
   </p:cSld>
@@ -5224,7 +6209,7 @@
               <a:pPr eaLnBrk="0" hangingPunct="0">
                 <a:defRPr/>
               </a:pPr>
-              <a:t>07 August 2014</a:t>
+              <a:t>08 August 2014</a:t>
             </a:fld>
             <a:endParaRPr lang="en-US" sz="900" dirty="0">
               <a:solidFill>
@@ -5317,7 +6302,7 @@
     </p:spTree>
     <p:extLst>
       <p:ext uri="{BB962C8B-B14F-4D97-AF65-F5344CB8AC3E}">
-        <p14:creationId xmlns:p14="http://schemas.microsoft.com/office/powerpoint/2010/main" xmlns="" val="3500233434"/>
+        <p14:creationId xmlns:p14="http://schemas.microsoft.com/office/powerpoint/2010/main" val="3500233434"/>
       </p:ext>
     </p:extLst>
   </p:cSld>
@@ -5612,7 +6597,7 @@
           <a:blip r:embed="rId3" cstate="screen">
             <a:extLst>
               <a:ext uri="{28A0092B-C50C-407E-A947-70E740481C1C}">
-                <a14:useLocalDpi xmlns:a14="http://schemas.microsoft.com/office/drawing/2010/main" xmlns=""/>
+                <a14:useLocalDpi xmlns:a14="http://schemas.microsoft.com/office/drawing/2010/main"/>
               </a:ext>
             </a:extLst>
           </a:blip>
@@ -5719,7 +6704,7 @@
               <a:pPr eaLnBrk="0" hangingPunct="0">
                 <a:defRPr/>
               </a:pPr>
-              <a:t>07 August 2014</a:t>
+              <a:t>08 August 2014</a:t>
             </a:fld>
             <a:endParaRPr lang="en-US" sz="900" dirty="0">
               <a:solidFill>
@@ -5812,7 +6797,7 @@
     </p:spTree>
     <p:extLst>
       <p:ext uri="{BB962C8B-B14F-4D97-AF65-F5344CB8AC3E}">
-        <p14:creationId xmlns:p14="http://schemas.microsoft.com/office/powerpoint/2010/main" xmlns="" val="2213761293"/>
+        <p14:creationId xmlns:p14="http://schemas.microsoft.com/office/powerpoint/2010/main" val="2213761293"/>
       </p:ext>
     </p:extLst>
   </p:cSld>
@@ -6107,7 +7092,7 @@
           <a:blip r:embed="rId3">
             <a:extLst>
               <a:ext uri="{28A0092B-C50C-407E-A947-70E740481C1C}">
-                <a14:useLocalDpi xmlns:a14="http://schemas.microsoft.com/office/drawing/2010/main" xmlns=""/>
+                <a14:useLocalDpi xmlns:a14="http://schemas.microsoft.com/office/drawing/2010/main"/>
               </a:ext>
             </a:extLst>
           </a:blip>
@@ -6215,7 +7200,7 @@
               <a:pPr eaLnBrk="0" hangingPunct="0">
                 <a:defRPr/>
               </a:pPr>
-              <a:t>07 August 2014</a:t>
+              <a:t>08 August 2014</a:t>
             </a:fld>
             <a:endParaRPr lang="en-US" sz="900" dirty="0">
               <a:solidFill>
@@ -6308,7 +7293,7 @@
     </p:spTree>
     <p:extLst>
       <p:ext uri="{BB962C8B-B14F-4D97-AF65-F5344CB8AC3E}">
-        <p14:creationId xmlns:p14="http://schemas.microsoft.com/office/powerpoint/2010/main" xmlns="" val="3641185151"/>
+        <p14:creationId xmlns:p14="http://schemas.microsoft.com/office/powerpoint/2010/main" val="3641185151"/>
       </p:ext>
     </p:extLst>
   </p:cSld>
@@ -6603,7 +7588,7 @@
           <a:blip r:embed="rId3">
             <a:extLst>
               <a:ext uri="{28A0092B-C50C-407E-A947-70E740481C1C}">
-                <a14:useLocalDpi xmlns:a14="http://schemas.microsoft.com/office/drawing/2010/main" xmlns=""/>
+                <a14:useLocalDpi xmlns:a14="http://schemas.microsoft.com/office/drawing/2010/main"/>
               </a:ext>
             </a:extLst>
           </a:blip>
@@ -6711,7 +7696,7 @@
               <a:pPr eaLnBrk="0" hangingPunct="0">
                 <a:defRPr/>
               </a:pPr>
-              <a:t>07 August 2014</a:t>
+              <a:t>08 August 2014</a:t>
             </a:fld>
             <a:endParaRPr lang="en-US" sz="900" dirty="0">
               <a:solidFill>
@@ -6804,7 +7789,7 @@
     </p:spTree>
     <p:extLst>
       <p:ext uri="{BB962C8B-B14F-4D97-AF65-F5344CB8AC3E}">
-        <p14:creationId xmlns:p14="http://schemas.microsoft.com/office/powerpoint/2010/main" xmlns="" val="1453757578"/>
+        <p14:creationId xmlns:p14="http://schemas.microsoft.com/office/powerpoint/2010/main" val="1453757578"/>
       </p:ext>
     </p:extLst>
   </p:cSld>
@@ -7099,7 +8084,7 @@
           <a:blip r:embed="rId3">
             <a:extLst>
               <a:ext uri="{28A0092B-C50C-407E-A947-70E740481C1C}">
-                <a14:useLocalDpi xmlns:a14="http://schemas.microsoft.com/office/drawing/2010/main" xmlns=""/>
+                <a14:useLocalDpi xmlns:a14="http://schemas.microsoft.com/office/drawing/2010/main"/>
               </a:ext>
             </a:extLst>
           </a:blip>
@@ -7207,7 +8192,7 @@
               <a:pPr eaLnBrk="0" hangingPunct="0">
                 <a:defRPr/>
               </a:pPr>
-              <a:t>07 August 2014</a:t>
+              <a:t>08 August 2014</a:t>
             </a:fld>
             <a:endParaRPr lang="en-US" sz="900" dirty="0">
               <a:solidFill>
@@ -7300,7 +8285,7 @@
     </p:spTree>
     <p:extLst>
       <p:ext uri="{BB962C8B-B14F-4D97-AF65-F5344CB8AC3E}">
-        <p14:creationId xmlns:p14="http://schemas.microsoft.com/office/powerpoint/2010/main" xmlns="" val="3612892179"/>
+        <p14:creationId xmlns:p14="http://schemas.microsoft.com/office/powerpoint/2010/main" val="3612892179"/>
       </p:ext>
     </p:extLst>
   </p:cSld>
@@ -7595,7 +8580,7 @@
           <a:blip r:embed="rId3">
             <a:extLst>
               <a:ext uri="{28A0092B-C50C-407E-A947-70E740481C1C}">
-                <a14:useLocalDpi xmlns:a14="http://schemas.microsoft.com/office/drawing/2010/main" xmlns=""/>
+                <a14:useLocalDpi xmlns:a14="http://schemas.microsoft.com/office/drawing/2010/main"/>
               </a:ext>
             </a:extLst>
           </a:blip>
@@ -7703,7 +8688,7 @@
               <a:pPr eaLnBrk="0" hangingPunct="0">
                 <a:defRPr/>
               </a:pPr>
-              <a:t>07 August 2014</a:t>
+              <a:t>08 August 2014</a:t>
             </a:fld>
             <a:endParaRPr lang="en-US" sz="900" dirty="0">
               <a:solidFill>
@@ -7796,7 +8781,7 @@
     </p:spTree>
     <p:extLst>
       <p:ext uri="{BB962C8B-B14F-4D97-AF65-F5344CB8AC3E}">
-        <p14:creationId xmlns:p14="http://schemas.microsoft.com/office/powerpoint/2010/main" xmlns="" val="670919311"/>
+        <p14:creationId xmlns:p14="http://schemas.microsoft.com/office/powerpoint/2010/main" val="670919311"/>
       </p:ext>
     </p:extLst>
   </p:cSld>
@@ -8091,7 +9076,7 @@
           <a:blip r:embed="rId3">
             <a:extLst>
               <a:ext uri="{28A0092B-C50C-407E-A947-70E740481C1C}">
-                <a14:useLocalDpi xmlns:a14="http://schemas.microsoft.com/office/drawing/2010/main" xmlns=""/>
+                <a14:useLocalDpi xmlns:a14="http://schemas.microsoft.com/office/drawing/2010/main"/>
               </a:ext>
             </a:extLst>
           </a:blip>
@@ -8199,7 +9184,7 @@
               <a:pPr eaLnBrk="0" hangingPunct="0">
                 <a:defRPr/>
               </a:pPr>
-              <a:t>07 August 2014</a:t>
+              <a:t>08 August 2014</a:t>
             </a:fld>
             <a:endParaRPr lang="en-US" sz="900" dirty="0">
               <a:solidFill>
@@ -8292,7 +9277,7 @@
     </p:spTree>
     <p:extLst>
       <p:ext uri="{BB962C8B-B14F-4D97-AF65-F5344CB8AC3E}">
-        <p14:creationId xmlns:p14="http://schemas.microsoft.com/office/powerpoint/2010/main" xmlns="" val="2658852093"/>
+        <p14:creationId xmlns:p14="http://schemas.microsoft.com/office/powerpoint/2010/main" val="2658852093"/>
       </p:ext>
     </p:extLst>
   </p:cSld>
@@ -8582,7 +9567,7 @@
           <a:blip r:embed="rId2" cstate="screen">
             <a:extLst>
               <a:ext uri="{28A0092B-C50C-407E-A947-70E740481C1C}">
-                <a14:useLocalDpi xmlns:a14="http://schemas.microsoft.com/office/drawing/2010/main" xmlns=""/>
+                <a14:useLocalDpi xmlns:a14="http://schemas.microsoft.com/office/drawing/2010/main"/>
               </a:ext>
             </a:extLst>
           </a:blip>
@@ -8688,7 +9673,7 @@
           <a:blip r:embed="rId3" cstate="screen">
             <a:extLst>
               <a:ext uri="{28A0092B-C50C-407E-A947-70E740481C1C}">
-                <a14:useLocalDpi xmlns:a14="http://schemas.microsoft.com/office/drawing/2010/main" xmlns=""/>
+                <a14:useLocalDpi xmlns:a14="http://schemas.microsoft.com/office/drawing/2010/main"/>
               </a:ext>
             </a:extLst>
           </a:blip>
@@ -8788,7 +9773,7 @@
     </p:spTree>
     <p:extLst>
       <p:ext uri="{BB962C8B-B14F-4D97-AF65-F5344CB8AC3E}">
-        <p14:creationId xmlns:p14="http://schemas.microsoft.com/office/powerpoint/2010/main" xmlns="" val="632282784"/>
+        <p14:creationId xmlns:p14="http://schemas.microsoft.com/office/powerpoint/2010/main" val="632282784"/>
       </p:ext>
     </p:extLst>
   </p:cSld>
@@ -8831,10 +9816,10 @@
           <p:nvPr/>
         </p:nvPicPr>
         <p:blipFill>
-          <a:blip r:embed="rId2" cstate="screen">
+          <a:blip r:embed="rId3" cstate="screen">
             <a:extLst>
               <a:ext uri="{28A0092B-C50C-407E-A947-70E740481C1C}">
-                <a14:useLocalDpi xmlns:a14="http://schemas.microsoft.com/office/drawing/2010/main" xmlns=""/>
+                <a14:useLocalDpi xmlns:a14="http://schemas.microsoft.com/office/drawing/2010/main"/>
               </a:ext>
             </a:extLst>
           </a:blip>
@@ -8975,7 +9960,19 @@
               <a:rPr lang="en-US" sz="1200" dirty="0" smtClean="0">
                 <a:latin typeface="Trade Gothic Next LT Pro Lt" charset="0"/>
               </a:rPr>
-              <a:t>The QNX platform is already running on our BlackBerry Handsets and most In-car entertainment systems. </a:t>
+              <a:t>The QNX platform is already running on our BlackBerry Handsets and </a:t>
+            </a:r>
+            <a:r>
+              <a:rPr lang="en-US" sz="1200" dirty="0" smtClean="0">
+                <a:latin typeface="Trade Gothic Next LT Pro Lt" charset="0"/>
+              </a:rPr>
+              <a:t>in most </a:t>
+            </a:r>
+            <a:r>
+              <a:rPr lang="en-US" sz="1200" dirty="0" smtClean="0">
+                <a:latin typeface="Trade Gothic Next LT Pro Lt" charset="0"/>
+              </a:rPr>
+              <a:t>In-car entertainment systems. </a:t>
             </a:r>
           </a:p>
           <a:p>
@@ -9028,7 +10025,7 @@
     </p:spTree>
     <p:extLst>
       <p:ext uri="{BB962C8B-B14F-4D97-AF65-F5344CB8AC3E}">
-        <p14:creationId xmlns:p14="http://schemas.microsoft.com/office/powerpoint/2010/main" xmlns="" val="2558665998"/>
+        <p14:creationId xmlns:p14="http://schemas.microsoft.com/office/powerpoint/2010/main" val="2558665998"/>
       </p:ext>
     </p:extLst>
   </p:cSld>
@@ -9038,7 +10035,375 @@
   <p:timing>
     <p:tnLst>
       <p:par>
-        <p:cTn id="1" dur="indefinite" restart="never" nodeType="tmRoot"/>
+        <p:cTn id="1" dur="indefinite" restart="never" nodeType="tmRoot">
+          <p:childTnLst>
+            <p:seq concurrent="1" nextAc="seek">
+              <p:cTn id="2" dur="indefinite" nodeType="mainSeq">
+                <p:childTnLst>
+                  <p:par>
+                    <p:cTn id="3" fill="hold">
+                      <p:stCondLst>
+                        <p:cond delay="indefinite"/>
+                      </p:stCondLst>
+                      <p:childTnLst>
+                        <p:par>
+                          <p:cTn id="4" fill="hold">
+                            <p:stCondLst>
+                              <p:cond delay="0"/>
+                            </p:stCondLst>
+                            <p:childTnLst>
+                              <p:par>
+                                <p:cTn id="5" presetID="42" presetClass="entr" presetSubtype="0" fill="hold" nodeType="clickEffect">
+                                  <p:stCondLst>
+                                    <p:cond delay="0"/>
+                                  </p:stCondLst>
+                                  <p:childTnLst>
+                                    <p:set>
+                                      <p:cBhvr>
+                                        <p:cTn id="6" dur="1" fill="hold">
+                                          <p:stCondLst>
+                                            <p:cond delay="0"/>
+                                          </p:stCondLst>
+                                        </p:cTn>
+                                        <p:tgtEl>
+                                          <p:spTgt spid="7">
+                                            <p:txEl>
+                                              <p:pRg st="0" end="0"/>
+                                            </p:txEl>
+                                          </p:spTgt>
+                                        </p:tgtEl>
+                                        <p:attrNameLst>
+                                          <p:attrName>style.visibility</p:attrName>
+                                        </p:attrNameLst>
+                                      </p:cBhvr>
+                                      <p:to>
+                                        <p:strVal val="visible"/>
+                                      </p:to>
+                                    </p:set>
+                                    <p:animEffect transition="in" filter="fade">
+                                      <p:cBhvr>
+                                        <p:cTn id="7" dur="1000"/>
+                                        <p:tgtEl>
+                                          <p:spTgt spid="7">
+                                            <p:txEl>
+                                              <p:pRg st="0" end="0"/>
+                                            </p:txEl>
+                                          </p:spTgt>
+                                        </p:tgtEl>
+                                      </p:cBhvr>
+                                    </p:animEffect>
+                                    <p:anim calcmode="lin" valueType="num">
+                                      <p:cBhvr>
+                                        <p:cTn id="8" dur="1000" fill="hold"/>
+                                        <p:tgtEl>
+                                          <p:spTgt spid="7">
+                                            <p:txEl>
+                                              <p:pRg st="0" end="0"/>
+                                            </p:txEl>
+                                          </p:spTgt>
+                                        </p:tgtEl>
+                                        <p:attrNameLst>
+                                          <p:attrName>ppt_x</p:attrName>
+                                        </p:attrNameLst>
+                                      </p:cBhvr>
+                                      <p:tavLst>
+                                        <p:tav tm="0">
+                                          <p:val>
+                                            <p:strVal val="#ppt_x"/>
+                                          </p:val>
+                                        </p:tav>
+                                        <p:tav tm="100000">
+                                          <p:val>
+                                            <p:strVal val="#ppt_x"/>
+                                          </p:val>
+                                        </p:tav>
+                                      </p:tavLst>
+                                    </p:anim>
+                                    <p:anim calcmode="lin" valueType="num">
+                                      <p:cBhvr>
+                                        <p:cTn id="9" dur="1000" fill="hold"/>
+                                        <p:tgtEl>
+                                          <p:spTgt spid="7">
+                                            <p:txEl>
+                                              <p:pRg st="0" end="0"/>
+                                            </p:txEl>
+                                          </p:spTgt>
+                                        </p:tgtEl>
+                                        <p:attrNameLst>
+                                          <p:attrName>ppt_y</p:attrName>
+                                        </p:attrNameLst>
+                                      </p:cBhvr>
+                                      <p:tavLst>
+                                        <p:tav tm="0">
+                                          <p:val>
+                                            <p:strVal val="#ppt_y+.1"/>
+                                          </p:val>
+                                        </p:tav>
+                                        <p:tav tm="100000">
+                                          <p:val>
+                                            <p:strVal val="#ppt_y"/>
+                                          </p:val>
+                                        </p:tav>
+                                      </p:tavLst>
+                                    </p:anim>
+                                  </p:childTnLst>
+                                </p:cTn>
+                              </p:par>
+                            </p:childTnLst>
+                          </p:cTn>
+                        </p:par>
+                      </p:childTnLst>
+                    </p:cTn>
+                  </p:par>
+                  <p:par>
+                    <p:cTn id="10" fill="hold">
+                      <p:stCondLst>
+                        <p:cond delay="indefinite"/>
+                      </p:stCondLst>
+                      <p:childTnLst>
+                        <p:par>
+                          <p:cTn id="11" fill="hold">
+                            <p:stCondLst>
+                              <p:cond delay="0"/>
+                            </p:stCondLst>
+                            <p:childTnLst>
+                              <p:par>
+                                <p:cTn id="12" presetID="42" presetClass="entr" presetSubtype="0" fill="hold" nodeType="clickEffect">
+                                  <p:stCondLst>
+                                    <p:cond delay="0"/>
+                                  </p:stCondLst>
+                                  <p:childTnLst>
+                                    <p:set>
+                                      <p:cBhvr>
+                                        <p:cTn id="13" dur="1" fill="hold">
+                                          <p:stCondLst>
+                                            <p:cond delay="0"/>
+                                          </p:stCondLst>
+                                        </p:cTn>
+                                        <p:tgtEl>
+                                          <p:spTgt spid="7">
+                                            <p:txEl>
+                                              <p:pRg st="1" end="1"/>
+                                            </p:txEl>
+                                          </p:spTgt>
+                                        </p:tgtEl>
+                                        <p:attrNameLst>
+                                          <p:attrName>style.visibility</p:attrName>
+                                        </p:attrNameLst>
+                                      </p:cBhvr>
+                                      <p:to>
+                                        <p:strVal val="visible"/>
+                                      </p:to>
+                                    </p:set>
+                                    <p:animEffect transition="in" filter="fade">
+                                      <p:cBhvr>
+                                        <p:cTn id="14" dur="1000"/>
+                                        <p:tgtEl>
+                                          <p:spTgt spid="7">
+                                            <p:txEl>
+                                              <p:pRg st="1" end="1"/>
+                                            </p:txEl>
+                                          </p:spTgt>
+                                        </p:tgtEl>
+                                      </p:cBhvr>
+                                    </p:animEffect>
+                                    <p:anim calcmode="lin" valueType="num">
+                                      <p:cBhvr>
+                                        <p:cTn id="15" dur="1000" fill="hold"/>
+                                        <p:tgtEl>
+                                          <p:spTgt spid="7">
+                                            <p:txEl>
+                                              <p:pRg st="1" end="1"/>
+                                            </p:txEl>
+                                          </p:spTgt>
+                                        </p:tgtEl>
+                                        <p:attrNameLst>
+                                          <p:attrName>ppt_x</p:attrName>
+                                        </p:attrNameLst>
+                                      </p:cBhvr>
+                                      <p:tavLst>
+                                        <p:tav tm="0">
+                                          <p:val>
+                                            <p:strVal val="#ppt_x"/>
+                                          </p:val>
+                                        </p:tav>
+                                        <p:tav tm="100000">
+                                          <p:val>
+                                            <p:strVal val="#ppt_x"/>
+                                          </p:val>
+                                        </p:tav>
+                                      </p:tavLst>
+                                    </p:anim>
+                                    <p:anim calcmode="lin" valueType="num">
+                                      <p:cBhvr>
+                                        <p:cTn id="16" dur="1000" fill="hold"/>
+                                        <p:tgtEl>
+                                          <p:spTgt spid="7">
+                                            <p:txEl>
+                                              <p:pRg st="1" end="1"/>
+                                            </p:txEl>
+                                          </p:spTgt>
+                                        </p:tgtEl>
+                                        <p:attrNameLst>
+                                          <p:attrName>ppt_y</p:attrName>
+                                        </p:attrNameLst>
+                                      </p:cBhvr>
+                                      <p:tavLst>
+                                        <p:tav tm="0">
+                                          <p:val>
+                                            <p:strVal val="#ppt_y+.1"/>
+                                          </p:val>
+                                        </p:tav>
+                                        <p:tav tm="100000">
+                                          <p:val>
+                                            <p:strVal val="#ppt_y"/>
+                                          </p:val>
+                                        </p:tav>
+                                      </p:tavLst>
+                                    </p:anim>
+                                  </p:childTnLst>
+                                </p:cTn>
+                              </p:par>
+                            </p:childTnLst>
+                          </p:cTn>
+                        </p:par>
+                      </p:childTnLst>
+                    </p:cTn>
+                  </p:par>
+                  <p:par>
+                    <p:cTn id="17" fill="hold">
+                      <p:stCondLst>
+                        <p:cond delay="indefinite"/>
+                      </p:stCondLst>
+                      <p:childTnLst>
+                        <p:par>
+                          <p:cTn id="18" fill="hold">
+                            <p:stCondLst>
+                              <p:cond delay="0"/>
+                            </p:stCondLst>
+                            <p:childTnLst>
+                              <p:par>
+                                <p:cTn id="19" presetID="42" presetClass="entr" presetSubtype="0" fill="hold" nodeType="clickEffect">
+                                  <p:stCondLst>
+                                    <p:cond delay="0"/>
+                                  </p:stCondLst>
+                                  <p:childTnLst>
+                                    <p:set>
+                                      <p:cBhvr>
+                                        <p:cTn id="20" dur="1" fill="hold">
+                                          <p:stCondLst>
+                                            <p:cond delay="0"/>
+                                          </p:stCondLst>
+                                        </p:cTn>
+                                        <p:tgtEl>
+                                          <p:spTgt spid="7">
+                                            <p:txEl>
+                                              <p:pRg st="2" end="2"/>
+                                            </p:txEl>
+                                          </p:spTgt>
+                                        </p:tgtEl>
+                                        <p:attrNameLst>
+                                          <p:attrName>style.visibility</p:attrName>
+                                        </p:attrNameLst>
+                                      </p:cBhvr>
+                                      <p:to>
+                                        <p:strVal val="visible"/>
+                                      </p:to>
+                                    </p:set>
+                                    <p:animEffect transition="in" filter="fade">
+                                      <p:cBhvr>
+                                        <p:cTn id="21" dur="1000"/>
+                                        <p:tgtEl>
+                                          <p:spTgt spid="7">
+                                            <p:txEl>
+                                              <p:pRg st="2" end="2"/>
+                                            </p:txEl>
+                                          </p:spTgt>
+                                        </p:tgtEl>
+                                      </p:cBhvr>
+                                    </p:animEffect>
+                                    <p:anim calcmode="lin" valueType="num">
+                                      <p:cBhvr>
+                                        <p:cTn id="22" dur="1000" fill="hold"/>
+                                        <p:tgtEl>
+                                          <p:spTgt spid="7">
+                                            <p:txEl>
+                                              <p:pRg st="2" end="2"/>
+                                            </p:txEl>
+                                          </p:spTgt>
+                                        </p:tgtEl>
+                                        <p:attrNameLst>
+                                          <p:attrName>ppt_x</p:attrName>
+                                        </p:attrNameLst>
+                                      </p:cBhvr>
+                                      <p:tavLst>
+                                        <p:tav tm="0">
+                                          <p:val>
+                                            <p:strVal val="#ppt_x"/>
+                                          </p:val>
+                                        </p:tav>
+                                        <p:tav tm="100000">
+                                          <p:val>
+                                            <p:strVal val="#ppt_x"/>
+                                          </p:val>
+                                        </p:tav>
+                                      </p:tavLst>
+                                    </p:anim>
+                                    <p:anim calcmode="lin" valueType="num">
+                                      <p:cBhvr>
+                                        <p:cTn id="23" dur="1000" fill="hold"/>
+                                        <p:tgtEl>
+                                          <p:spTgt spid="7">
+                                            <p:txEl>
+                                              <p:pRg st="2" end="2"/>
+                                            </p:txEl>
+                                          </p:spTgt>
+                                        </p:tgtEl>
+                                        <p:attrNameLst>
+                                          <p:attrName>ppt_y</p:attrName>
+                                        </p:attrNameLst>
+                                      </p:cBhvr>
+                                      <p:tavLst>
+                                        <p:tav tm="0">
+                                          <p:val>
+                                            <p:strVal val="#ppt_y+.1"/>
+                                          </p:val>
+                                        </p:tav>
+                                        <p:tav tm="100000">
+                                          <p:val>
+                                            <p:strVal val="#ppt_y"/>
+                                          </p:val>
+                                        </p:tav>
+                                      </p:tavLst>
+                                    </p:anim>
+                                  </p:childTnLst>
+                                </p:cTn>
+                              </p:par>
+                            </p:childTnLst>
+                          </p:cTn>
+                        </p:par>
+                      </p:childTnLst>
+                    </p:cTn>
+                  </p:par>
+                </p:childTnLst>
+              </p:cTn>
+              <p:prevCondLst>
+                <p:cond evt="onPrev" delay="0">
+                  <p:tgtEl>
+                    <p:sldTgt/>
+                  </p:tgtEl>
+                </p:cond>
+              </p:prevCondLst>
+              <p:nextCondLst>
+                <p:cond evt="onNext" delay="0">
+                  <p:tgtEl>
+                    <p:sldTgt/>
+                  </p:tgtEl>
+                </p:cond>
+              </p:nextCondLst>
+            </p:seq>
+          </p:childTnLst>
+        </p:cTn>
       </p:par>
     </p:tnLst>
   </p:timing>
@@ -9165,24 +10530,9 @@
               <a:buChar char="•"/>
             </a:pPr>
             <a:r>
-              <a:rPr lang="en-US" sz="1200" u="sng" dirty="0" smtClean="0">
-                <a:hlinkClick r:id="rId2"/>
-              </a:rPr>
-              <a:t> http</a:t>
+              <a:rPr lang="en-US" sz="1200" u="sng" dirty="0" smtClean="0"/>
+              <a:t> http://www.businessinsider.com/75-billion-devices-will-be-connected-to-the-internet-by-2020-2013-10</a:t>
             </a:r>
-            <a:r>
-              <a:rPr lang="en-US" sz="1200" u="sng" dirty="0" smtClean="0">
-                <a:hlinkClick r:id="rId2"/>
-              </a:rPr>
-              <a:t>://</a:t>
-            </a:r>
-            <a:r>
-              <a:rPr lang="en-US" sz="1200" u="sng" dirty="0" smtClean="0">
-                <a:hlinkClick r:id="rId2"/>
-              </a:rPr>
-              <a:t>www.businessinsider.com/75-billion-devices-will-be-connected-to-the-internet-by-2020-2013-10</a:t>
-            </a:r>
-            <a:endParaRPr lang="en-US" sz="1200" u="sng" dirty="0" smtClean="0"/>
           </a:p>
           <a:p>
             <a:pPr>
@@ -9196,16 +10546,8 @@
               <a:buChar char="•"/>
             </a:pPr>
             <a:r>
-              <a:rPr lang="en-US" sz="1200" u="sng" dirty="0" smtClean="0">
-                <a:hlinkClick r:id="rId3"/>
-              </a:rPr>
-              <a:t> https</a:t>
-            </a:r>
-            <a:r>
-              <a:rPr lang="en-US" sz="1200" u="sng" dirty="0" smtClean="0">
-                <a:hlinkClick r:id="rId3"/>
-              </a:rPr>
-              <a:t>://evrythng.com/2014/01/2014-iot-predictions/</a:t>
+              <a:rPr lang="en-US" sz="1200" u="sng" dirty="0" smtClean="0"/>
+              <a:t> https://evrythng.com/2014/01/2014-iot-predictions/</a:t>
             </a:r>
             <a:endParaRPr lang="en-GB" sz="1200" dirty="0" smtClean="0"/>
           </a:p>
@@ -9221,16 +10563,8 @@
               <a:buChar char="•"/>
             </a:pPr>
             <a:r>
-              <a:rPr lang="en-US" sz="1200" u="sng" dirty="0" smtClean="0">
-                <a:hlinkClick r:id="rId4"/>
-              </a:rPr>
-              <a:t> http</a:t>
-            </a:r>
-            <a:r>
-              <a:rPr lang="en-US" sz="1200" u="sng" dirty="0" smtClean="0">
-                <a:hlinkClick r:id="rId4"/>
-              </a:rPr>
-              <a:t>://www.techopedia.com/definition/28247/internet-of-things-iot</a:t>
+              <a:rPr lang="en-US" sz="1200" u="sng" dirty="0" smtClean="0"/>
+              <a:t> http://www.techopedia.com/definition/28247/internet-of-things-iot</a:t>
             </a:r>
             <a:endParaRPr lang="en-GB" sz="1200" dirty="0" smtClean="0"/>
           </a:p>
@@ -9247,11 +10581,7 @@
             </a:pPr>
             <a:r>
               <a:rPr lang="en-US" sz="1200" dirty="0" smtClean="0"/>
-              <a:t> http</a:t>
-            </a:r>
-            <a:r>
-              <a:rPr lang="en-US" sz="1200" dirty="0" smtClean="0"/>
-              <a:t>://whatis.techtarget.com/definition/thing-in-the-Internet-of-Things</a:t>
+              <a:t> http://whatis.techtarget.com/definition/thing-in-the-Internet-of-Things</a:t>
             </a:r>
             <a:endParaRPr lang="en-GB" sz="1200" dirty="0" smtClean="0"/>
           </a:p>
@@ -9267,23 +10597,25 @@
               <a:buChar char="•"/>
             </a:pPr>
             <a:r>
-              <a:rPr lang="en-US" sz="1200" dirty="0" smtClean="0">
-                <a:hlinkClick r:id="rId5"/>
-              </a:rPr>
-              <a:t> http</a:t>
+              <a:rPr lang="en-US" sz="1200" dirty="0" smtClean="0"/>
+              <a:t> http://www.cmswire.com/cms/internet-of-things/working-smart-the-internet-of-things-and-connected-offices-024457.php</a:t>
+            </a:r>
+          </a:p>
+          <a:p>
+            <a:pPr>
+              <a:buFont typeface="Arial" pitchFamily="34" charset="0"/>
+              <a:buChar char="•"/>
+            </a:pPr>
+            <a:r>
+              <a:rPr lang="en-US" sz="1200" dirty="0" smtClean="0"/>
+              <a:t>http://techcrunch.com/2014/05/21/blackberry-reveals-project-ion-its-qnx-powered-effort-to-underpin-the-internet-of-things</a:t>
             </a:r>
             <a:r>
-              <a:rPr lang="en-US" sz="1200" dirty="0" smtClean="0">
-                <a:hlinkClick r:id="rId5"/>
-              </a:rPr>
-              <a:t>://</a:t>
+              <a:rPr lang="en-US" sz="1200" dirty="0" smtClean="0"/>
+              <a:t>/</a:t>
             </a:r>
-            <a:r>
-              <a:rPr lang="en-US" sz="1200" dirty="0" smtClean="0">
-                <a:hlinkClick r:id="rId5"/>
-              </a:rPr>
-              <a:t>www.cmswire.com/cms/internet-of-things/working-smart-the-internet-of-things-and-connected-offices-024457.php</a:t>
-            </a:r>
+          </a:p>
+          <a:p>
             <a:endParaRPr lang="en-US" sz="1200" dirty="0" smtClean="0"/>
           </a:p>
           <a:p>
@@ -9292,8 +10624,8 @@
               <a:buChar char="•"/>
             </a:pPr>
             <a:r>
-              <a:rPr lang="en-US" sz="1200" dirty="0" smtClean="0"/>
-              <a:t>http://techcrunch.com/2014/05/21/blackberry-reveals-project-ion-its-qnx-powered-effort-to-underpin-the-internet-of-things/</a:t>
+              <a:rPr lang="en-GB" sz="1200" dirty="0"/>
+              <a:t>http://el.blackberry.com/project-ion</a:t>
             </a:r>
             <a:endParaRPr lang="en-GB" sz="1200" dirty="0" smtClean="0"/>
           </a:p>
@@ -9365,6 +10697,13 @@
   <p:clrMapOvr>
     <a:masterClrMapping/>
   </p:clrMapOvr>
+  <p:timing>
+    <p:tnLst>
+      <p:par>
+        <p:cTn id="1" dur="indefinite" restart="never" nodeType="tmRoot"/>
+      </p:par>
+    </p:tnLst>
+  </p:timing>
 </p:sld>
 </file>
 
@@ -9444,7 +10783,7 @@
     </p:spTree>
     <p:extLst>
       <p:ext uri="{BB962C8B-B14F-4D97-AF65-F5344CB8AC3E}">
-        <p14:creationId xmlns:p14="http://schemas.microsoft.com/office/powerpoint/2010/main" xmlns="" val="3064546428"/>
+        <p14:creationId xmlns:p14="http://schemas.microsoft.com/office/powerpoint/2010/main" val="3064546428"/>
       </p:ext>
     </p:extLst>
   </p:cSld>
@@ -9547,10 +10886,10 @@
           <p:nvPr/>
         </p:nvPicPr>
         <p:blipFill>
-          <a:blip r:embed="rId2" cstate="screen">
+          <a:blip r:embed="rId3" cstate="screen">
             <a:extLst>
               <a:ext uri="{28A0092B-C50C-407E-A947-70E740481C1C}">
-                <a14:useLocalDpi xmlns:a14="http://schemas.microsoft.com/office/drawing/2010/main" xmlns=""/>
+                <a14:useLocalDpi xmlns:a14="http://schemas.microsoft.com/office/drawing/2010/main"/>
               </a:ext>
             </a:extLst>
           </a:blip>
@@ -9685,7 +11024,7 @@
               <a:rPr lang="en-GB" sz="1400" dirty="0" smtClean="0">
                 <a:latin typeface="Trade Gothic Next LT Pro Lt" charset="0"/>
               </a:rPr>
-              <a:t>Pros</a:t>
+              <a:t>Project Ion &amp; BlackBerry</a:t>
             </a:r>
             <a:endParaRPr lang="en-GB" sz="1400" dirty="0">
               <a:latin typeface="Trade Gothic Next LT Pro Lt" charset="0"/>
@@ -9696,9 +11035,6 @@
               <a:spcBef>
                 <a:spcPct val="20000"/>
               </a:spcBef>
-              <a:spcAft>
-                <a:spcPts val="600"/>
-              </a:spcAft>
               <a:buFont typeface="Arial" charset="0"/>
               <a:buChar char="•"/>
             </a:pPr>
@@ -9706,16 +11042,14 @@
               <a:rPr lang="en-GB" sz="1400" dirty="0" smtClean="0">
                 <a:latin typeface="Trade Gothic Next LT Pro Lt" charset="0"/>
               </a:rPr>
-              <a:t>Cons</a:t>
+              <a:t>References </a:t>
             </a:r>
           </a:p>
           <a:p>
-            <a:pPr marL="171450" indent="-171450" eaLnBrk="0" hangingPunct="0">
+            <a:pPr eaLnBrk="0" hangingPunct="0">
               <a:spcBef>
                 <a:spcPct val="20000"/>
               </a:spcBef>
-              <a:buFont typeface="Arial" charset="0"/>
-              <a:buChar char="•"/>
             </a:pPr>
             <a:endParaRPr lang="en-US" sz="1400" dirty="0" smtClean="0">
               <a:latin typeface="Trade Gothic Next LT Pro Lt" charset="0"/>
@@ -9738,7 +11072,7 @@
     </p:spTree>
     <p:extLst>
       <p:ext uri="{BB962C8B-B14F-4D97-AF65-F5344CB8AC3E}">
-        <p14:creationId xmlns:p14="http://schemas.microsoft.com/office/powerpoint/2010/main" xmlns="" val="4150656003"/>
+        <p14:creationId xmlns:p14="http://schemas.microsoft.com/office/powerpoint/2010/main" val="4150656003"/>
       </p:ext>
     </p:extLst>
   </p:cSld>
@@ -9841,10 +11175,10 @@
           <p:nvPr/>
         </p:nvPicPr>
         <p:blipFill>
-          <a:blip r:embed="rId2" cstate="screen">
+          <a:blip r:embed="rId3" cstate="screen">
             <a:extLst>
               <a:ext uri="{28A0092B-C50C-407E-A947-70E740481C1C}">
-                <a14:useLocalDpi xmlns:a14="http://schemas.microsoft.com/office/drawing/2010/main" xmlns=""/>
+                <a14:useLocalDpi xmlns:a14="http://schemas.microsoft.com/office/drawing/2010/main"/>
               </a:ext>
             </a:extLst>
           </a:blip>
@@ -9954,7 +11288,7 @@
     </p:spTree>
     <p:extLst>
       <p:ext uri="{BB962C8B-B14F-4D97-AF65-F5344CB8AC3E}">
-        <p14:creationId xmlns:p14="http://schemas.microsoft.com/office/powerpoint/2010/main" xmlns="" val="3186257983"/>
+        <p14:creationId xmlns:p14="http://schemas.microsoft.com/office/powerpoint/2010/main" val="3186257983"/>
       </p:ext>
     </p:extLst>
   </p:cSld>
@@ -9964,7 +11298,260 @@
   <p:timing>
     <p:tnLst>
       <p:par>
-        <p:cTn id="1" dur="indefinite" restart="never" nodeType="tmRoot"/>
+        <p:cTn id="1" dur="indefinite" restart="never" nodeType="tmRoot">
+          <p:childTnLst>
+            <p:seq concurrent="1" nextAc="seek">
+              <p:cTn id="2" dur="indefinite" nodeType="mainSeq">
+                <p:childTnLst>
+                  <p:par>
+                    <p:cTn id="3" fill="hold">
+                      <p:stCondLst>
+                        <p:cond delay="indefinite"/>
+                      </p:stCondLst>
+                      <p:childTnLst>
+                        <p:par>
+                          <p:cTn id="4" fill="hold">
+                            <p:stCondLst>
+                              <p:cond delay="0"/>
+                            </p:stCondLst>
+                            <p:childTnLst>
+                              <p:par>
+                                <p:cTn id="5" presetID="42" presetClass="entr" presetSubtype="0" fill="hold" nodeType="clickEffect">
+                                  <p:stCondLst>
+                                    <p:cond delay="0"/>
+                                  </p:stCondLst>
+                                  <p:childTnLst>
+                                    <p:set>
+                                      <p:cBhvr>
+                                        <p:cTn id="6" dur="1" fill="hold">
+                                          <p:stCondLst>
+                                            <p:cond delay="0"/>
+                                          </p:stCondLst>
+                                        </p:cTn>
+                                        <p:tgtEl>
+                                          <p:spTgt spid="5">
+                                            <p:txEl>
+                                              <p:pRg st="0" end="0"/>
+                                            </p:txEl>
+                                          </p:spTgt>
+                                        </p:tgtEl>
+                                        <p:attrNameLst>
+                                          <p:attrName>style.visibility</p:attrName>
+                                        </p:attrNameLst>
+                                      </p:cBhvr>
+                                      <p:to>
+                                        <p:strVal val="visible"/>
+                                      </p:to>
+                                    </p:set>
+                                    <p:animEffect transition="in" filter="fade">
+                                      <p:cBhvr>
+                                        <p:cTn id="7" dur="1000"/>
+                                        <p:tgtEl>
+                                          <p:spTgt spid="5">
+                                            <p:txEl>
+                                              <p:pRg st="0" end="0"/>
+                                            </p:txEl>
+                                          </p:spTgt>
+                                        </p:tgtEl>
+                                      </p:cBhvr>
+                                    </p:animEffect>
+                                    <p:anim calcmode="lin" valueType="num">
+                                      <p:cBhvr>
+                                        <p:cTn id="8" dur="1000" fill="hold"/>
+                                        <p:tgtEl>
+                                          <p:spTgt spid="5">
+                                            <p:txEl>
+                                              <p:pRg st="0" end="0"/>
+                                            </p:txEl>
+                                          </p:spTgt>
+                                        </p:tgtEl>
+                                        <p:attrNameLst>
+                                          <p:attrName>ppt_x</p:attrName>
+                                        </p:attrNameLst>
+                                      </p:cBhvr>
+                                      <p:tavLst>
+                                        <p:tav tm="0">
+                                          <p:val>
+                                            <p:strVal val="#ppt_x"/>
+                                          </p:val>
+                                        </p:tav>
+                                        <p:tav tm="100000">
+                                          <p:val>
+                                            <p:strVal val="#ppt_x"/>
+                                          </p:val>
+                                        </p:tav>
+                                      </p:tavLst>
+                                    </p:anim>
+                                    <p:anim calcmode="lin" valueType="num">
+                                      <p:cBhvr>
+                                        <p:cTn id="9" dur="1000" fill="hold"/>
+                                        <p:tgtEl>
+                                          <p:spTgt spid="5">
+                                            <p:txEl>
+                                              <p:pRg st="0" end="0"/>
+                                            </p:txEl>
+                                          </p:spTgt>
+                                        </p:tgtEl>
+                                        <p:attrNameLst>
+                                          <p:attrName>ppt_y</p:attrName>
+                                        </p:attrNameLst>
+                                      </p:cBhvr>
+                                      <p:tavLst>
+                                        <p:tav tm="0">
+                                          <p:val>
+                                            <p:strVal val="#ppt_y+.1"/>
+                                          </p:val>
+                                        </p:tav>
+                                        <p:tav tm="100000">
+                                          <p:val>
+                                            <p:strVal val="#ppt_y"/>
+                                          </p:val>
+                                        </p:tav>
+                                      </p:tavLst>
+                                    </p:anim>
+                                  </p:childTnLst>
+                                </p:cTn>
+                              </p:par>
+                            </p:childTnLst>
+                          </p:cTn>
+                        </p:par>
+                      </p:childTnLst>
+                    </p:cTn>
+                  </p:par>
+                  <p:par>
+                    <p:cTn id="10" fill="hold">
+                      <p:stCondLst>
+                        <p:cond delay="indefinite"/>
+                      </p:stCondLst>
+                      <p:childTnLst>
+                        <p:par>
+                          <p:cTn id="11" fill="hold">
+                            <p:stCondLst>
+                              <p:cond delay="0"/>
+                            </p:stCondLst>
+                            <p:childTnLst>
+                              <p:par>
+                                <p:cTn id="12" presetID="42" presetClass="entr" presetSubtype="0" fill="hold" nodeType="clickEffect">
+                                  <p:stCondLst>
+                                    <p:cond delay="0"/>
+                                  </p:stCondLst>
+                                  <p:childTnLst>
+                                    <p:set>
+                                      <p:cBhvr>
+                                        <p:cTn id="13" dur="1" fill="hold">
+                                          <p:stCondLst>
+                                            <p:cond delay="0"/>
+                                          </p:stCondLst>
+                                        </p:cTn>
+                                        <p:tgtEl>
+                                          <p:spTgt spid="5">
+                                            <p:txEl>
+                                              <p:pRg st="2" end="2"/>
+                                            </p:txEl>
+                                          </p:spTgt>
+                                        </p:tgtEl>
+                                        <p:attrNameLst>
+                                          <p:attrName>style.visibility</p:attrName>
+                                        </p:attrNameLst>
+                                      </p:cBhvr>
+                                      <p:to>
+                                        <p:strVal val="visible"/>
+                                      </p:to>
+                                    </p:set>
+                                    <p:animEffect transition="in" filter="fade">
+                                      <p:cBhvr>
+                                        <p:cTn id="14" dur="1000"/>
+                                        <p:tgtEl>
+                                          <p:spTgt spid="5">
+                                            <p:txEl>
+                                              <p:pRg st="2" end="2"/>
+                                            </p:txEl>
+                                          </p:spTgt>
+                                        </p:tgtEl>
+                                      </p:cBhvr>
+                                    </p:animEffect>
+                                    <p:anim calcmode="lin" valueType="num">
+                                      <p:cBhvr>
+                                        <p:cTn id="15" dur="1000" fill="hold"/>
+                                        <p:tgtEl>
+                                          <p:spTgt spid="5">
+                                            <p:txEl>
+                                              <p:pRg st="2" end="2"/>
+                                            </p:txEl>
+                                          </p:spTgt>
+                                        </p:tgtEl>
+                                        <p:attrNameLst>
+                                          <p:attrName>ppt_x</p:attrName>
+                                        </p:attrNameLst>
+                                      </p:cBhvr>
+                                      <p:tavLst>
+                                        <p:tav tm="0">
+                                          <p:val>
+                                            <p:strVal val="#ppt_x"/>
+                                          </p:val>
+                                        </p:tav>
+                                        <p:tav tm="100000">
+                                          <p:val>
+                                            <p:strVal val="#ppt_x"/>
+                                          </p:val>
+                                        </p:tav>
+                                      </p:tavLst>
+                                    </p:anim>
+                                    <p:anim calcmode="lin" valueType="num">
+                                      <p:cBhvr>
+                                        <p:cTn id="16" dur="1000" fill="hold"/>
+                                        <p:tgtEl>
+                                          <p:spTgt spid="5">
+                                            <p:txEl>
+                                              <p:pRg st="2" end="2"/>
+                                            </p:txEl>
+                                          </p:spTgt>
+                                        </p:tgtEl>
+                                        <p:attrNameLst>
+                                          <p:attrName>ppt_y</p:attrName>
+                                        </p:attrNameLst>
+                                      </p:cBhvr>
+                                      <p:tavLst>
+                                        <p:tav tm="0">
+                                          <p:val>
+                                            <p:strVal val="#ppt_y+.1"/>
+                                          </p:val>
+                                        </p:tav>
+                                        <p:tav tm="100000">
+                                          <p:val>
+                                            <p:strVal val="#ppt_y"/>
+                                          </p:val>
+                                        </p:tav>
+                                      </p:tavLst>
+                                    </p:anim>
+                                  </p:childTnLst>
+                                </p:cTn>
+                              </p:par>
+                            </p:childTnLst>
+                          </p:cTn>
+                        </p:par>
+                      </p:childTnLst>
+                    </p:cTn>
+                  </p:par>
+                </p:childTnLst>
+              </p:cTn>
+              <p:prevCondLst>
+                <p:cond evt="onPrev" delay="0">
+                  <p:tgtEl>
+                    <p:sldTgt/>
+                  </p:tgtEl>
+                </p:cond>
+              </p:prevCondLst>
+              <p:nextCondLst>
+                <p:cond evt="onNext" delay="0">
+                  <p:tgtEl>
+                    <p:sldTgt/>
+                  </p:tgtEl>
+                </p:cond>
+              </p:nextCondLst>
+            </p:seq>
+          </p:childTnLst>
+        </p:cTn>
       </p:par>
     </p:tnLst>
   </p:timing>
@@ -10066,7 +11653,7 @@
     </p:spTree>
     <p:extLst>
       <p:ext uri="{BB962C8B-B14F-4D97-AF65-F5344CB8AC3E}">
-        <p14:creationId xmlns:p14="http://schemas.microsoft.com/office/powerpoint/2010/main" xmlns="" val="1034456225"/>
+        <p14:creationId xmlns:p14="http://schemas.microsoft.com/office/powerpoint/2010/main" val="1034456225"/>
       </p:ext>
     </p:extLst>
   </p:cSld>
@@ -10176,10 +11763,10 @@
           <p:nvPr/>
         </p:nvPicPr>
         <p:blipFill>
-          <a:blip r:embed="rId2" cstate="screen">
+          <a:blip r:embed="rId3" cstate="screen">
             <a:extLst>
               <a:ext uri="{28A0092B-C50C-407E-A947-70E740481C1C}">
-                <a14:useLocalDpi xmlns:a14="http://schemas.microsoft.com/office/drawing/2010/main" xmlns=""/>
+                <a14:useLocalDpi xmlns:a14="http://schemas.microsoft.com/office/drawing/2010/main"/>
               </a:ext>
             </a:extLst>
           </a:blip>
@@ -10276,7 +11863,7 @@
     </p:spTree>
     <p:extLst>
       <p:ext uri="{BB962C8B-B14F-4D97-AF65-F5344CB8AC3E}">
-        <p14:creationId xmlns:p14="http://schemas.microsoft.com/office/powerpoint/2010/main" xmlns="" val="337613936"/>
+        <p14:creationId xmlns:p14="http://schemas.microsoft.com/office/powerpoint/2010/main" val="337613936"/>
       </p:ext>
     </p:extLst>
   </p:cSld>
@@ -10686,7 +12273,7 @@
     </p:spTree>
     <p:extLst>
       <p:ext uri="{BB962C8B-B14F-4D97-AF65-F5344CB8AC3E}">
-        <p14:creationId xmlns:p14="http://schemas.microsoft.com/office/powerpoint/2010/main" xmlns="" val="710501511"/>
+        <p14:creationId xmlns:p14="http://schemas.microsoft.com/office/powerpoint/2010/main" val="710501511"/>
       </p:ext>
     </p:extLst>
   </p:cSld>
@@ -11225,10 +12812,10 @@
           <p:nvPr/>
         </p:nvPicPr>
         <p:blipFill>
-          <a:blip r:embed="rId2" cstate="screen">
+          <a:blip r:embed="rId3" cstate="screen">
             <a:extLst>
               <a:ext uri="{28A0092B-C50C-407E-A947-70E740481C1C}">
-                <a14:useLocalDpi xmlns:a14="http://schemas.microsoft.com/office/drawing/2010/main" xmlns=""/>
+                <a14:useLocalDpi xmlns:a14="http://schemas.microsoft.com/office/drawing/2010/main"/>
               </a:ext>
             </a:extLst>
           </a:blip>
@@ -11393,7 +12980,7 @@
     </p:spTree>
     <p:extLst>
       <p:ext uri="{BB962C8B-B14F-4D97-AF65-F5344CB8AC3E}">
-        <p14:creationId xmlns:p14="http://schemas.microsoft.com/office/powerpoint/2010/main" xmlns="" val="2558665998"/>
+        <p14:creationId xmlns:p14="http://schemas.microsoft.com/office/powerpoint/2010/main" val="2558665998"/>
       </p:ext>
     </p:extLst>
   </p:cSld>
@@ -11683,13 +13270,7 @@
               <a:rPr lang="en-US" sz="1200" dirty="0" smtClean="0">
                 <a:latin typeface="Trade Gothic Next LT Pro Lt" charset="0"/>
               </a:rPr>
-              <a:t>Use </a:t>
-            </a:r>
-            <a:r>
-              <a:rPr lang="en-US" sz="1200" dirty="0" smtClean="0">
-                <a:latin typeface="Trade Gothic Next LT Pro Lt" charset="0"/>
-              </a:rPr>
-              <a:t>Case: </a:t>
+              <a:t>Use Case: </a:t>
             </a:r>
           </a:p>
           <a:p>
@@ -11769,7 +13350,7 @@
     </p:spTree>
     <p:extLst>
       <p:ext uri="{BB962C8B-B14F-4D97-AF65-F5344CB8AC3E}">
-        <p14:creationId xmlns:p14="http://schemas.microsoft.com/office/powerpoint/2010/main" xmlns="" val="710501511"/>
+        <p14:creationId xmlns:p14="http://schemas.microsoft.com/office/powerpoint/2010/main" val="710501511"/>
       </p:ext>
     </p:extLst>
   </p:cSld>
@@ -12205,19 +13786,7 @@
               <a:rPr lang="en-US" sz="1200" dirty="0" smtClean="0">
                 <a:latin typeface="Trade Gothic Next LT Pro Lt" charset="0"/>
               </a:rPr>
-              <a:t>In May 2014 Blackberry </a:t>
-            </a:r>
-            <a:r>
-              <a:rPr lang="en-US" sz="1200" dirty="0" smtClean="0">
-                <a:latin typeface="Trade Gothic Next LT Pro Lt" charset="0"/>
-              </a:rPr>
-              <a:t>unveiled </a:t>
-            </a:r>
-            <a:r>
-              <a:rPr lang="en-US" sz="1200" dirty="0" smtClean="0">
-                <a:latin typeface="Trade Gothic Next LT Pro Lt" charset="0"/>
-              </a:rPr>
-              <a:t>a series of initiatives codenamed Project Ion. </a:t>
+              <a:t>In May 2014 Blackberry unveiled a series of initiatives codenamed Project Ion. </a:t>
             </a:r>
           </a:p>
           <a:p>
@@ -12290,7 +13859,7 @@
     </p:spTree>
     <p:extLst>
       <p:ext uri="{BB962C8B-B14F-4D97-AF65-F5344CB8AC3E}">
-        <p14:creationId xmlns:p14="http://schemas.microsoft.com/office/powerpoint/2010/main" xmlns="" val="4031510677"/>
+        <p14:creationId xmlns:p14="http://schemas.microsoft.com/office/powerpoint/2010/main" val="4031510677"/>
       </p:ext>
     </p:extLst>
   </p:cSld>
@@ -17428,6 +18997,24 @@
 </file>
 
 <file path=customXml/item1.xml><?xml version="1.0" encoding="utf-8"?>
+<?mso-contentType ?>
+<FormTemplates xmlns="http://schemas.microsoft.com/sharepoint/v3/contenttype/forms">
+  <Display>DocumentLibraryForm</Display>
+  <Edit>DocumentLibraryForm</Edit>
+  <New>DocumentLibraryForm</New>
+</FormTemplates>
+</file>
+
+<file path=customXml/item2.xml><?xml version="1.0" encoding="utf-8"?>
+<p:properties xmlns:p="http://schemas.microsoft.com/office/2006/metadata/properties" xmlns:xsi="http://www.w3.org/2001/XMLSchema-instance" xmlns:pc="http://schemas.microsoft.com/office/infopath/2007/PartnerControls">
+  <documentManagement>
+    <_Version xmlns="http://schemas.microsoft.com/sharepoint/v3/fields" xsi:nil="true"/>
+    <_Status xmlns="http://schemas.microsoft.com/sharepoint/v3/fields">Not Started</_Status>
+  </documentManagement>
+</p:properties>
+</file>
+
+<file path=customXml/item3.xml><?xml version="1.0" encoding="utf-8"?>
 <ct:contentTypeSchema xmlns:ct="http://schemas.microsoft.com/office/2006/metadata/contentType" xmlns:ma="http://schemas.microsoft.com/office/2006/metadata/properties/metaAttributes" ct:_="" ma:_="" ma:contentTypeName="Document" ma:contentTypeID="0x0101000DE64AEEDD9B7A4D93545ACBE97D4615" ma:contentTypeVersion="2" ma:contentTypeDescription="Create a new document." ma:contentTypeScope="" ma:versionID="f49002b78e3a4a71b814eef46a983816">
   <xsd:schema xmlns:xsd="http://www.w3.org/2001/XMLSchema" xmlns:xs="http://www.w3.org/2001/XMLSchema" xmlns:p="http://schemas.microsoft.com/office/2006/metadata/properties" xmlns:ns2="http://schemas.microsoft.com/sharepoint/v3/fields" targetNamespace="http://schemas.microsoft.com/office/2006/metadata/properties" ma:root="true" ma:fieldsID="38f6db2dd0d9a0cf6a8dc37be32b365b" ns2:_="">
     <xsd:import namespace="http://schemas.microsoft.com/sharepoint/v3/fields"/>
@@ -17571,38 +19158,10 @@
 </ct:contentTypeSchema>
 </file>
 
-<file path=customXml/item2.xml><?xml version="1.0" encoding="utf-8"?>
-<p:properties xmlns:p="http://schemas.microsoft.com/office/2006/metadata/properties" xmlns:xsi="http://www.w3.org/2001/XMLSchema-instance" xmlns:pc="http://schemas.microsoft.com/office/infopath/2007/PartnerControls">
-  <documentManagement>
-    <_Version xmlns="http://schemas.microsoft.com/sharepoint/v3/fields" xsi:nil="true"/>
-    <_Status xmlns="http://schemas.microsoft.com/sharepoint/v3/fields">Not Started</_Status>
-  </documentManagement>
-</p:properties>
-</file>
-
-<file path=customXml/item3.xml><?xml version="1.0" encoding="utf-8"?>
-<?mso-contentType ?>
-<FormTemplates xmlns="http://schemas.microsoft.com/sharepoint/v3/contenttype/forms">
-  <Display>DocumentLibraryForm</Display>
-  <Edit>DocumentLibraryForm</Edit>
-  <New>DocumentLibraryForm</New>
-</FormTemplates>
-</file>
-
 <file path=customXml/itemProps1.xml><?xml version="1.0" encoding="utf-8"?>
-<ds:datastoreItem xmlns:ds="http://schemas.openxmlformats.org/officeDocument/2006/customXml" ds:itemID="{E4214858-785C-42F7-BE66-6D0E79395FC8}">
+<ds:datastoreItem xmlns:ds="http://schemas.openxmlformats.org/officeDocument/2006/customXml" ds:itemID="{87D2A1B0-FF3E-4009-940D-AED0EB70AA20}">
   <ds:schemaRefs>
-    <ds:schemaRef ds:uri="http://schemas.microsoft.com/office/2006/metadata/contentType"/>
-    <ds:schemaRef ds:uri="http://schemas.microsoft.com/office/2006/metadata/properties/metaAttributes"/>
-    <ds:schemaRef ds:uri="http://www.w3.org/2001/XMLSchema"/>
-    <ds:schemaRef ds:uri="http://schemas.microsoft.com/office/2006/metadata/properties"/>
-    <ds:schemaRef ds:uri="http://schemas.microsoft.com/sharepoint/v3/fields"/>
-    <ds:schemaRef ds:uri="http://schemas.microsoft.com/office/2006/documentManagement/types"/>
-    <ds:schemaRef ds:uri="http://schemas.microsoft.com/office/infopath/2007/PartnerControls"/>
-    <ds:schemaRef ds:uri="http://schemas.openxmlformats.org/package/2006/metadata/core-properties"/>
-    <ds:schemaRef ds:uri="http://purl.org/dc/elements/1.1/"/>
-    <ds:schemaRef ds:uri="http://purl.org/dc/terms/"/>
-    <ds:schemaRef ds:uri="http://schemas.microsoft.com/internal/obd"/>
+    <ds:schemaRef ds:uri="http://schemas.microsoft.com/sharepoint/v3/contenttype/forms"/>
   </ds:schemaRefs>
 </ds:datastoreItem>
 </file>
@@ -17624,9 +19183,19 @@
 </file>
 
 <file path=customXml/itemProps3.xml><?xml version="1.0" encoding="utf-8"?>
-<ds:datastoreItem xmlns:ds="http://schemas.openxmlformats.org/officeDocument/2006/customXml" ds:itemID="{87D2A1B0-FF3E-4009-940D-AED0EB70AA20}">
+<ds:datastoreItem xmlns:ds="http://schemas.openxmlformats.org/officeDocument/2006/customXml" ds:itemID="{E4214858-785C-42F7-BE66-6D0E79395FC8}">
   <ds:schemaRefs>
-    <ds:schemaRef ds:uri="http://schemas.microsoft.com/sharepoint/v3/contenttype/forms"/>
+    <ds:schemaRef ds:uri="http://schemas.microsoft.com/office/2006/metadata/contentType"/>
+    <ds:schemaRef ds:uri="http://schemas.microsoft.com/office/2006/metadata/properties/metaAttributes"/>
+    <ds:schemaRef ds:uri="http://www.w3.org/2001/XMLSchema"/>
+    <ds:schemaRef ds:uri="http://schemas.microsoft.com/office/2006/metadata/properties"/>
+    <ds:schemaRef ds:uri="http://schemas.microsoft.com/sharepoint/v3/fields"/>
+    <ds:schemaRef ds:uri="http://schemas.microsoft.com/office/2006/documentManagement/types"/>
+    <ds:schemaRef ds:uri="http://schemas.microsoft.com/office/infopath/2007/PartnerControls"/>
+    <ds:schemaRef ds:uri="http://schemas.openxmlformats.org/package/2006/metadata/core-properties"/>
+    <ds:schemaRef ds:uri="http://purl.org/dc/elements/1.1/"/>
+    <ds:schemaRef ds:uri="http://purl.org/dc/terms/"/>
+    <ds:schemaRef ds:uri="http://schemas.microsoft.com/internal/obd"/>
   </ds:schemaRefs>
 </ds:datastoreItem>
 </file>
</xml_diff>

<commit_message>
finilized presentations and started work placement report
</commit_message>
<xml_diff>
--- a/IoT.pptx
+++ b/IoT.pptx
@@ -218,7 +218,7 @@
             <a:fld id="{87EDFAC8-5991-3145-9793-9A313C8FA165}" type="datetimeFigureOut">
               <a:rPr lang="en-US" smtClean="0"/>
               <a:pPr/>
-              <a:t>8/8/2014</a:t>
+              <a:t>8/11/2014</a:t>
             </a:fld>
             <a:endParaRPr lang="en-US"/>
           </a:p>
@@ -1100,19 +1100,7 @@
               <a:rPr lang="en-GB" sz="1200" dirty="0" smtClean="0">
                 <a:latin typeface="Trade Gothic Next LT Pro Lt" charset="0"/>
               </a:rPr>
-              <a:t>2. While </a:t>
-            </a:r>
-            <a:r>
-              <a:rPr lang="en-GB" sz="1200" dirty="0" smtClean="0">
-                <a:latin typeface="Trade Gothic Next LT Pro Lt" charset="0"/>
-              </a:rPr>
-              <a:t>the costs of sensors and actuators go down, more and more devices will integrate them into their </a:t>
-            </a:r>
-            <a:r>
-              <a:rPr lang="en-GB" sz="1200" dirty="0" smtClean="0">
-                <a:latin typeface="Trade Gothic Next LT Pro Lt" charset="0"/>
-              </a:rPr>
-              <a:t>systems. </a:t>
+              <a:t>2. While the costs of sensors and actuators go down, more and more devices will integrate them into their systems. </a:t>
             </a:r>
           </a:p>
           <a:p>
@@ -1360,15 +1348,7 @@
             </a:r>
             <a:r>
               <a:rPr lang="en-GB" baseline="0" dirty="0" smtClean="0"/>
-              <a:t> Here are a few examples of how it can be made applicable to an office </a:t>
-            </a:r>
-            <a:r>
-              <a:rPr lang="en-GB" baseline="0" dirty="0" err="1" smtClean="0"/>
-              <a:t>enviroment</a:t>
-            </a:r>
-            <a:r>
-              <a:rPr lang="en-GB" baseline="0" dirty="0" smtClean="0"/>
-              <a:t>. </a:t>
+              <a:t> Here are a few examples of how it can be made applicable to an office environment. </a:t>
             </a:r>
           </a:p>
           <a:p>
@@ -1377,15 +1357,7 @@
           <a:p>
             <a:r>
               <a:rPr lang="en-GB" baseline="0" dirty="0" smtClean="0"/>
-              <a:t>2. Eventually we will have a building wide system that integrates with the whole building to boost </a:t>
-            </a:r>
-            <a:r>
-              <a:rPr lang="en-GB" baseline="0" dirty="0" err="1" smtClean="0"/>
-              <a:t>efficency</a:t>
-            </a:r>
-            <a:r>
-              <a:rPr lang="en-GB" baseline="0" dirty="0" smtClean="0"/>
-              <a:t> and savings. </a:t>
+              <a:t>2. Eventually we will have a building wide system that integrates with the whole building to boost efficiency and savings. </a:t>
             </a:r>
           </a:p>
           <a:p>
@@ -2216,7 +2188,7 @@
               <a:pPr eaLnBrk="0" hangingPunct="0">
                 <a:defRPr/>
               </a:pPr>
-              <a:t>08 August 2014</a:t>
+              <a:t>11 August 2014</a:t>
             </a:fld>
             <a:endParaRPr lang="en-US" sz="900" dirty="0">
               <a:solidFill>
@@ -2720,7 +2692,7 @@
               <a:pPr eaLnBrk="0" hangingPunct="0">
                 <a:defRPr/>
               </a:pPr>
-              <a:t>08 August 2014</a:t>
+              <a:t>11 August 2014</a:t>
             </a:fld>
             <a:endParaRPr lang="en-US" sz="900" dirty="0">
               <a:solidFill>
@@ -3216,7 +3188,7 @@
               <a:pPr eaLnBrk="0" hangingPunct="0">
                 <a:defRPr/>
               </a:pPr>
-              <a:t>08 August 2014</a:t>
+              <a:t>11 August 2014</a:t>
             </a:fld>
             <a:endParaRPr lang="en-US" sz="900" dirty="0">
               <a:solidFill>
@@ -3721,7 +3693,7 @@
               <a:pPr eaLnBrk="0" hangingPunct="0">
                 <a:defRPr/>
               </a:pPr>
-              <a:t>08 August 2014</a:t>
+              <a:t>11 August 2014</a:t>
             </a:fld>
             <a:endParaRPr lang="en-US" sz="900" dirty="0">
               <a:solidFill>
@@ -4217,7 +4189,7 @@
               <a:pPr eaLnBrk="0" hangingPunct="0">
                 <a:defRPr/>
               </a:pPr>
-              <a:t>08 August 2014</a:t>
+              <a:t>11 August 2014</a:t>
             </a:fld>
             <a:endParaRPr lang="en-US" sz="900" dirty="0">
               <a:solidFill>
@@ -4713,7 +4685,7 @@
               <a:pPr eaLnBrk="0" hangingPunct="0">
                 <a:defRPr/>
               </a:pPr>
-              <a:t>08 August 2014</a:t>
+              <a:t>11 August 2014</a:t>
             </a:fld>
             <a:endParaRPr lang="en-US" sz="900" dirty="0">
               <a:solidFill>
@@ -5209,7 +5181,7 @@
               <a:pPr eaLnBrk="0" hangingPunct="0">
                 <a:defRPr/>
               </a:pPr>
-              <a:t>08 August 2014</a:t>
+              <a:t>11 August 2014</a:t>
             </a:fld>
             <a:endParaRPr lang="en-US" sz="900" dirty="0">
               <a:solidFill>
@@ -5675,7 +5647,7 @@
               <a:pPr eaLnBrk="0" hangingPunct="0">
                 <a:defRPr/>
               </a:pPr>
-              <a:t>08 August 2014</a:t>
+              <a:t>11 August 2014</a:t>
             </a:fld>
             <a:endParaRPr lang="en-US" sz="900" dirty="0">
               <a:solidFill>
@@ -6209,7 +6181,7 @@
               <a:pPr eaLnBrk="0" hangingPunct="0">
                 <a:defRPr/>
               </a:pPr>
-              <a:t>08 August 2014</a:t>
+              <a:t>11 August 2014</a:t>
             </a:fld>
             <a:endParaRPr lang="en-US" sz="900" dirty="0">
               <a:solidFill>
@@ -6704,7 +6676,7 @@
               <a:pPr eaLnBrk="0" hangingPunct="0">
                 <a:defRPr/>
               </a:pPr>
-              <a:t>08 August 2014</a:t>
+              <a:t>11 August 2014</a:t>
             </a:fld>
             <a:endParaRPr lang="en-US" sz="900" dirty="0">
               <a:solidFill>
@@ -7200,7 +7172,7 @@
               <a:pPr eaLnBrk="0" hangingPunct="0">
                 <a:defRPr/>
               </a:pPr>
-              <a:t>08 August 2014</a:t>
+              <a:t>11 August 2014</a:t>
             </a:fld>
             <a:endParaRPr lang="en-US" sz="900" dirty="0">
               <a:solidFill>
@@ -7696,7 +7668,7 @@
               <a:pPr eaLnBrk="0" hangingPunct="0">
                 <a:defRPr/>
               </a:pPr>
-              <a:t>08 August 2014</a:t>
+              <a:t>11 August 2014</a:t>
             </a:fld>
             <a:endParaRPr lang="en-US" sz="900" dirty="0">
               <a:solidFill>
@@ -8192,7 +8164,7 @@
               <a:pPr eaLnBrk="0" hangingPunct="0">
                 <a:defRPr/>
               </a:pPr>
-              <a:t>08 August 2014</a:t>
+              <a:t>11 August 2014</a:t>
             </a:fld>
             <a:endParaRPr lang="en-US" sz="900" dirty="0">
               <a:solidFill>
@@ -8688,7 +8660,7 @@
               <a:pPr eaLnBrk="0" hangingPunct="0">
                 <a:defRPr/>
               </a:pPr>
-              <a:t>08 August 2014</a:t>
+              <a:t>11 August 2014</a:t>
             </a:fld>
             <a:endParaRPr lang="en-US" sz="900" dirty="0">
               <a:solidFill>
@@ -9184,7 +9156,7 @@
               <a:pPr eaLnBrk="0" hangingPunct="0">
                 <a:defRPr/>
               </a:pPr>
-              <a:t>08 August 2014</a:t>
+              <a:t>11 August 2014</a:t>
             </a:fld>
             <a:endParaRPr lang="en-US" sz="900" dirty="0">
               <a:solidFill>
@@ -9960,19 +9932,7 @@
               <a:rPr lang="en-US" sz="1200" dirty="0" smtClean="0">
                 <a:latin typeface="Trade Gothic Next LT Pro Lt" charset="0"/>
               </a:rPr>
-              <a:t>The QNX platform is already running on our BlackBerry Handsets and </a:t>
-            </a:r>
-            <a:r>
-              <a:rPr lang="en-US" sz="1200" dirty="0" smtClean="0">
-                <a:latin typeface="Trade Gothic Next LT Pro Lt" charset="0"/>
-              </a:rPr>
-              <a:t>in most </a:t>
-            </a:r>
-            <a:r>
-              <a:rPr lang="en-US" sz="1200" dirty="0" smtClean="0">
-                <a:latin typeface="Trade Gothic Next LT Pro Lt" charset="0"/>
-              </a:rPr>
-              <a:t>In-car entertainment systems. </a:t>
+              <a:t>The QNX platform is already running on our BlackBerry Handsets and in most In-car entertainment systems. </a:t>
             </a:r>
           </a:p>
           <a:p>
@@ -10608,11 +10568,7 @@
             </a:pPr>
             <a:r>
               <a:rPr lang="en-US" sz="1200" dirty="0" smtClean="0"/>
-              <a:t>http://techcrunch.com/2014/05/21/blackberry-reveals-project-ion-its-qnx-powered-effort-to-underpin-the-internet-of-things</a:t>
-            </a:r>
-            <a:r>
-              <a:rPr lang="en-US" sz="1200" dirty="0" smtClean="0"/>
-              <a:t>/</a:t>
+              <a:t>http://techcrunch.com/2014/05/21/blackberry-reveals-project-ion-its-qnx-powered-effort-to-underpin-the-internet-of-things/</a:t>
             </a:r>
           </a:p>
           <a:p>
@@ -12956,7 +12912,13 @@
               <a:rPr lang="en-GB" sz="1200" dirty="0" smtClean="0">
                 <a:latin typeface="Trade Gothic Next LT Pro Lt" charset="0"/>
               </a:rPr>
-              <a:t>IoT will revolutionise the workplace and how an organisation runs not only in the office but also  </a:t>
+              <a:t>IoT will revolutionise the workplace and how an organisation runs not only </a:t>
+            </a:r>
+            <a:r>
+              <a:rPr lang="en-GB" sz="1200" dirty="0" smtClean="0">
+                <a:latin typeface="Trade Gothic Next LT Pro Lt" charset="0"/>
+              </a:rPr>
+              <a:t>at your desks but also in conferences and board rooms. </a:t>
             </a:r>
             <a:endParaRPr lang="en-US" sz="1200" dirty="0" smtClean="0">
               <a:latin typeface="Trade Gothic Next LT Pro Lt" charset="0"/>

</xml_diff>